<commit_message>
large progress to tipcalculator and screenshots
</commit_message>
<xml_diff>
--- a/403_Programming/assignments/tipcalculatorprogress_screenshots.pptx
+++ b/403_Programming/assignments/tipcalculatorprogress_screenshots.pptx
@@ -7,6 +7,22 @@
   <p:sldIdLst>
     <p:sldId id="256" r:id="rId2"/>
     <p:sldId id="257" r:id="rId3"/>
+    <p:sldId id="258" r:id="rId4"/>
+    <p:sldId id="259" r:id="rId5"/>
+    <p:sldId id="260" r:id="rId6"/>
+    <p:sldId id="261" r:id="rId7"/>
+    <p:sldId id="262" r:id="rId8"/>
+    <p:sldId id="263" r:id="rId9"/>
+    <p:sldId id="264" r:id="rId10"/>
+    <p:sldId id="265" r:id="rId11"/>
+    <p:sldId id="266" r:id="rId12"/>
+    <p:sldId id="267" r:id="rId13"/>
+    <p:sldId id="268" r:id="rId14"/>
+    <p:sldId id="269" r:id="rId15"/>
+    <p:sldId id="270" r:id="rId16"/>
+    <p:sldId id="271" r:id="rId17"/>
+    <p:sldId id="272" r:id="rId18"/>
+    <p:sldId id="273" r:id="rId19"/>
   </p:sldIdLst>
   <p:sldSz cx="12192000" cy="6858000"/>
   <p:notesSz cx="6858000" cy="9144000"/>
@@ -105,7 +121,745 @@
       </a:defRPr>
     </a:lvl9pPr>
   </p:defaultTextStyle>
+  <p:extLst>
+    <p:ext uri="{EFAFB233-063F-42B5-8137-9DF3F51BA10A}">
+      <p15:sldGuideLst xmlns:p15="http://schemas.microsoft.com/office/powerpoint/2012/main"/>
+    </p:ext>
+  </p:extLst>
 </p:presentation>
+</file>
+
+<file path=ppt/revisionInfo.xml><?xml version="1.0" encoding="utf-8"?>
+<p1510:revInfo xmlns:a="http://schemas.openxmlformats.org/drawingml/2006/main" xmlns:r="http://schemas.openxmlformats.org/officeDocument/2006/relationships" xmlns:p1510="http://schemas.microsoft.com/office/powerpoint/2015/10/main">
+  <p1510:revLst>
+    <p1510:client id="{0208D28F-4B44-44FE-A743-3A5E11BBCB5A}" v="42" dt="2025-02-11T12:50:23.333"/>
+  </p1510:revLst>
+</p1510:revInfo>
+</file>
+
+<file path=ppt/changesInfos/changesInfo1.xml><?xml version="1.0" encoding="utf-8"?>
+<pc:chgInfo xmlns:a="http://schemas.openxmlformats.org/drawingml/2006/main" xmlns:r="http://schemas.openxmlformats.org/officeDocument/2006/relationships" xmlns:ac="http://schemas.microsoft.com/office/drawing/2013/main/command" xmlns:pc="http://schemas.microsoft.com/office/powerpoint/2013/main/command">
+  <pc:docChgLst>
+    <pc:chgData name="Ocean Graham" userId="c784d4c6-724f-4452-8baf-8c216b3c246d" providerId="ADAL" clId="{0208D28F-4B44-44FE-A743-3A5E11BBCB5A}"/>
+    <pc:docChg chg="custSel addSld modSld">
+      <pc:chgData name="Ocean Graham" userId="c784d4c6-724f-4452-8baf-8c216b3c246d" providerId="ADAL" clId="{0208D28F-4B44-44FE-A743-3A5E11BBCB5A}" dt="2025-02-11T12:50:28.613" v="1292" actId="1076"/>
+      <pc:docMkLst>
+        <pc:docMk/>
+      </pc:docMkLst>
+      <pc:sldChg chg="addSp delSp modSp mod">
+        <pc:chgData name="Ocean Graham" userId="c784d4c6-724f-4452-8baf-8c216b3c246d" providerId="ADAL" clId="{0208D28F-4B44-44FE-A743-3A5E11BBCB5A}" dt="2025-02-11T09:21:23.258" v="59" actId="27614"/>
+        <pc:sldMkLst>
+          <pc:docMk/>
+          <pc:sldMk cId="161817149" sldId="257"/>
+        </pc:sldMkLst>
+        <pc:spChg chg="mod">
+          <ac:chgData name="Ocean Graham" userId="c784d4c6-724f-4452-8baf-8c216b3c246d" providerId="ADAL" clId="{0208D28F-4B44-44FE-A743-3A5E11BBCB5A}" dt="2025-02-11T09:12:06.550" v="54" actId="20577"/>
+          <ac:spMkLst>
+            <pc:docMk/>
+            <pc:sldMk cId="161817149" sldId="257"/>
+            <ac:spMk id="2" creationId="{D2D6F85F-5098-D2F9-5925-7D5A726C9025}"/>
+          </ac:spMkLst>
+        </pc:spChg>
+        <pc:picChg chg="add mod">
+          <ac:chgData name="Ocean Graham" userId="c784d4c6-724f-4452-8baf-8c216b3c246d" providerId="ADAL" clId="{0208D28F-4B44-44FE-A743-3A5E11BBCB5A}" dt="2025-02-11T09:12:21.276" v="55" actId="1076"/>
+          <ac:picMkLst>
+            <pc:docMk/>
+            <pc:sldMk cId="161817149" sldId="257"/>
+            <ac:picMk id="4" creationId="{429E9EBF-69E5-8217-E080-8BDAF0B9CD2C}"/>
+          </ac:picMkLst>
+        </pc:picChg>
+        <pc:picChg chg="del">
+          <ac:chgData name="Ocean Graham" userId="c784d4c6-724f-4452-8baf-8c216b3c246d" providerId="ADAL" clId="{0208D28F-4B44-44FE-A743-3A5E11BBCB5A}" dt="2025-02-11T09:12:23.175" v="56" actId="21"/>
+          <ac:picMkLst>
+            <pc:docMk/>
+            <pc:sldMk cId="161817149" sldId="257"/>
+            <ac:picMk id="7" creationId="{B997B37A-B4E8-A2AC-CCBC-8B73BF16E577}"/>
+          </ac:picMkLst>
+        </pc:picChg>
+        <pc:picChg chg="add mod">
+          <ac:chgData name="Ocean Graham" userId="c784d4c6-724f-4452-8baf-8c216b3c246d" providerId="ADAL" clId="{0208D28F-4B44-44FE-A743-3A5E11BBCB5A}" dt="2025-02-11T09:21:23.258" v="59" actId="27614"/>
+          <ac:picMkLst>
+            <pc:docMk/>
+            <pc:sldMk cId="161817149" sldId="257"/>
+            <ac:picMk id="8" creationId="{F8947451-E1FE-2221-3106-952796E6319D}"/>
+          </ac:picMkLst>
+        </pc:picChg>
+      </pc:sldChg>
+      <pc:sldChg chg="addSp delSp modSp new mod">
+        <pc:chgData name="Ocean Graham" userId="c784d4c6-724f-4452-8baf-8c216b3c246d" providerId="ADAL" clId="{0208D28F-4B44-44FE-A743-3A5E11BBCB5A}" dt="2025-02-11T10:37:20.205" v="157" actId="1076"/>
+        <pc:sldMkLst>
+          <pc:docMk/>
+          <pc:sldMk cId="3760246311" sldId="258"/>
+        </pc:sldMkLst>
+        <pc:spChg chg="mod">
+          <ac:chgData name="Ocean Graham" userId="c784d4c6-724f-4452-8baf-8c216b3c246d" providerId="ADAL" clId="{0208D28F-4B44-44FE-A743-3A5E11BBCB5A}" dt="2025-02-11T09:37:35.887" v="131" actId="20577"/>
+          <ac:spMkLst>
+            <pc:docMk/>
+            <pc:sldMk cId="3760246311" sldId="258"/>
+            <ac:spMk id="2" creationId="{8F7ED36C-7668-3D63-2ADA-181C1C3342E4}"/>
+          </ac:spMkLst>
+        </pc:spChg>
+        <pc:spChg chg="del">
+          <ac:chgData name="Ocean Graham" userId="c784d4c6-724f-4452-8baf-8c216b3c246d" providerId="ADAL" clId="{0208D28F-4B44-44FE-A743-3A5E11BBCB5A}" dt="2025-02-11T09:38:12.214" v="132" actId="931"/>
+          <ac:spMkLst>
+            <pc:docMk/>
+            <pc:sldMk cId="3760246311" sldId="258"/>
+            <ac:spMk id="3" creationId="{8B50AC34-5A98-4E94-65D6-6127E8E57907}"/>
+          </ac:spMkLst>
+        </pc:spChg>
+        <pc:spChg chg="add del mod">
+          <ac:chgData name="Ocean Graham" userId="c784d4c6-724f-4452-8baf-8c216b3c246d" providerId="ADAL" clId="{0208D28F-4B44-44FE-A743-3A5E11BBCB5A}" dt="2025-02-11T10:36:14.961" v="144" actId="931"/>
+          <ac:spMkLst>
+            <pc:docMk/>
+            <pc:sldMk cId="3760246311" sldId="258"/>
+            <ac:spMk id="9" creationId="{BF5EAD1B-F284-C021-0525-EFA973CFD8EC}"/>
+          </ac:spMkLst>
+        </pc:spChg>
+        <pc:picChg chg="add del mod">
+          <ac:chgData name="Ocean Graham" userId="c784d4c6-724f-4452-8baf-8c216b3c246d" providerId="ADAL" clId="{0208D28F-4B44-44FE-A743-3A5E11BBCB5A}" dt="2025-02-11T10:35:43.451" v="143" actId="21"/>
+          <ac:picMkLst>
+            <pc:docMk/>
+            <pc:sldMk cId="3760246311" sldId="258"/>
+            <ac:picMk id="5" creationId="{E3F151CE-08E8-852C-161C-A3026C453F6D}"/>
+          </ac:picMkLst>
+        </pc:picChg>
+        <pc:picChg chg="add del mod">
+          <ac:chgData name="Ocean Graham" userId="c784d4c6-724f-4452-8baf-8c216b3c246d" providerId="ADAL" clId="{0208D28F-4B44-44FE-A743-3A5E11BBCB5A}" dt="2025-02-11T10:36:32.817" v="151" actId="21"/>
+          <ac:picMkLst>
+            <pc:docMk/>
+            <pc:sldMk cId="3760246311" sldId="258"/>
+            <ac:picMk id="7" creationId="{74352A76-ADBE-3486-A7E8-C7962B089730}"/>
+          </ac:picMkLst>
+        </pc:picChg>
+        <pc:picChg chg="add mod">
+          <ac:chgData name="Ocean Graham" userId="c784d4c6-724f-4452-8baf-8c216b3c246d" providerId="ADAL" clId="{0208D28F-4B44-44FE-A743-3A5E11BBCB5A}" dt="2025-02-11T10:37:06.311" v="152" actId="1076"/>
+          <ac:picMkLst>
+            <pc:docMk/>
+            <pc:sldMk cId="3760246311" sldId="258"/>
+            <ac:picMk id="11" creationId="{6FE1E951-19AC-53F2-F09C-54BF06352479}"/>
+          </ac:picMkLst>
+        </pc:picChg>
+        <pc:picChg chg="add mod">
+          <ac:chgData name="Ocean Graham" userId="c784d4c6-724f-4452-8baf-8c216b3c246d" providerId="ADAL" clId="{0208D28F-4B44-44FE-A743-3A5E11BBCB5A}" dt="2025-02-11T10:37:20.205" v="157" actId="1076"/>
+          <ac:picMkLst>
+            <pc:docMk/>
+            <pc:sldMk cId="3760246311" sldId="258"/>
+            <ac:picMk id="13" creationId="{2FE78B0A-6938-73DE-1C75-CC373DD5C1DF}"/>
+          </ac:picMkLst>
+        </pc:picChg>
+      </pc:sldChg>
+      <pc:sldChg chg="addSp delSp modSp new mod">
+        <pc:chgData name="Ocean Graham" userId="c784d4c6-724f-4452-8baf-8c216b3c246d" providerId="ADAL" clId="{0208D28F-4B44-44FE-A743-3A5E11BBCB5A}" dt="2025-02-11T11:45:13.875" v="280" actId="20577"/>
+        <pc:sldMkLst>
+          <pc:docMk/>
+          <pc:sldMk cId="4131830494" sldId="259"/>
+        </pc:sldMkLst>
+        <pc:spChg chg="mod">
+          <ac:chgData name="Ocean Graham" userId="c784d4c6-724f-4452-8baf-8c216b3c246d" providerId="ADAL" clId="{0208D28F-4B44-44FE-A743-3A5E11BBCB5A}" dt="2025-02-11T11:40:13.533" v="179" actId="20577"/>
+          <ac:spMkLst>
+            <pc:docMk/>
+            <pc:sldMk cId="4131830494" sldId="259"/>
+            <ac:spMk id="2" creationId="{8E21CA3A-EE4D-FB2D-166D-C46D89334A1D}"/>
+          </ac:spMkLst>
+        </pc:spChg>
+        <pc:spChg chg="del">
+          <ac:chgData name="Ocean Graham" userId="c784d4c6-724f-4452-8baf-8c216b3c246d" providerId="ADAL" clId="{0208D28F-4B44-44FE-A743-3A5E11BBCB5A}" dt="2025-02-11T11:40:38.938" v="180" actId="931"/>
+          <ac:spMkLst>
+            <pc:docMk/>
+            <pc:sldMk cId="4131830494" sldId="259"/>
+            <ac:spMk id="3" creationId="{845352A6-E670-DE39-160E-CF66B5852AE5}"/>
+          </ac:spMkLst>
+        </pc:spChg>
+        <pc:spChg chg="add mod">
+          <ac:chgData name="Ocean Graham" userId="c784d4c6-724f-4452-8baf-8c216b3c246d" providerId="ADAL" clId="{0208D28F-4B44-44FE-A743-3A5E11BBCB5A}" dt="2025-02-11T11:45:13.875" v="280" actId="20577"/>
+          <ac:spMkLst>
+            <pc:docMk/>
+            <pc:sldMk cId="4131830494" sldId="259"/>
+            <ac:spMk id="8" creationId="{C13D0700-EFE0-32BE-0529-3D790C615069}"/>
+          </ac:spMkLst>
+        </pc:spChg>
+        <pc:picChg chg="add mod">
+          <ac:chgData name="Ocean Graham" userId="c784d4c6-724f-4452-8baf-8c216b3c246d" providerId="ADAL" clId="{0208D28F-4B44-44FE-A743-3A5E11BBCB5A}" dt="2025-02-11T11:41:08.405" v="191" actId="1076"/>
+          <ac:picMkLst>
+            <pc:docMk/>
+            <pc:sldMk cId="4131830494" sldId="259"/>
+            <ac:picMk id="5" creationId="{55A6516F-AD6A-1111-12B9-19970EBF0E31}"/>
+          </ac:picMkLst>
+        </pc:picChg>
+        <pc:picChg chg="add mod">
+          <ac:chgData name="Ocean Graham" userId="c784d4c6-724f-4452-8baf-8c216b3c246d" providerId="ADAL" clId="{0208D28F-4B44-44FE-A743-3A5E11BBCB5A}" dt="2025-02-11T11:41:06.626" v="190" actId="1076"/>
+          <ac:picMkLst>
+            <pc:docMk/>
+            <pc:sldMk cId="4131830494" sldId="259"/>
+            <ac:picMk id="7" creationId="{129AF40C-3584-DBFD-F5BE-3121B100ADF1}"/>
+          </ac:picMkLst>
+        </pc:picChg>
+      </pc:sldChg>
+      <pc:sldChg chg="addSp delSp modSp new mod">
+        <pc:chgData name="Ocean Graham" userId="c784d4c6-724f-4452-8baf-8c216b3c246d" providerId="ADAL" clId="{0208D28F-4B44-44FE-A743-3A5E11BBCB5A}" dt="2025-02-11T11:49:38.073" v="330" actId="20577"/>
+        <pc:sldMkLst>
+          <pc:docMk/>
+          <pc:sldMk cId="3764378544" sldId="260"/>
+        </pc:sldMkLst>
+        <pc:spChg chg="mod">
+          <ac:chgData name="Ocean Graham" userId="c784d4c6-724f-4452-8baf-8c216b3c246d" providerId="ADAL" clId="{0208D28F-4B44-44FE-A743-3A5E11BBCB5A}" dt="2025-02-11T11:49:38.073" v="330" actId="20577"/>
+          <ac:spMkLst>
+            <pc:docMk/>
+            <pc:sldMk cId="3764378544" sldId="260"/>
+            <ac:spMk id="2" creationId="{700961BB-984D-02C2-02B2-3BCD4BC924A4}"/>
+          </ac:spMkLst>
+        </pc:spChg>
+        <pc:spChg chg="del">
+          <ac:chgData name="Ocean Graham" userId="c784d4c6-724f-4452-8baf-8c216b3c246d" providerId="ADAL" clId="{0208D28F-4B44-44FE-A743-3A5E11BBCB5A}" dt="2025-02-11T11:48:51.762" v="310" actId="931"/>
+          <ac:spMkLst>
+            <pc:docMk/>
+            <pc:sldMk cId="3764378544" sldId="260"/>
+            <ac:spMk id="3" creationId="{13665374-12F4-479B-BA60-F60C4FBCDCA4}"/>
+          </ac:spMkLst>
+        </pc:spChg>
+        <pc:picChg chg="add mod">
+          <ac:chgData name="Ocean Graham" userId="c784d4c6-724f-4452-8baf-8c216b3c246d" providerId="ADAL" clId="{0208D28F-4B44-44FE-A743-3A5E11BBCB5A}" dt="2025-02-11T11:49:30.200" v="323" actId="1076"/>
+          <ac:picMkLst>
+            <pc:docMk/>
+            <pc:sldMk cId="3764378544" sldId="260"/>
+            <ac:picMk id="5" creationId="{FD017DD4-6E61-0717-1DBD-5621F13AB62E}"/>
+          </ac:picMkLst>
+        </pc:picChg>
+        <pc:picChg chg="add mod">
+          <ac:chgData name="Ocean Graham" userId="c784d4c6-724f-4452-8baf-8c216b3c246d" providerId="ADAL" clId="{0208D28F-4B44-44FE-A743-3A5E11BBCB5A}" dt="2025-02-11T11:49:31.730" v="324" actId="1076"/>
+          <ac:picMkLst>
+            <pc:docMk/>
+            <pc:sldMk cId="3764378544" sldId="260"/>
+            <ac:picMk id="7" creationId="{CCB9A00A-BE1A-F36C-2958-F8982C20D2CF}"/>
+          </ac:picMkLst>
+        </pc:picChg>
+      </pc:sldChg>
+      <pc:sldChg chg="addSp delSp modSp new mod">
+        <pc:chgData name="Ocean Graham" userId="c784d4c6-724f-4452-8baf-8c216b3c246d" providerId="ADAL" clId="{0208D28F-4B44-44FE-A743-3A5E11BBCB5A}" dt="2025-02-11T11:54:21.111" v="500" actId="20577"/>
+        <pc:sldMkLst>
+          <pc:docMk/>
+          <pc:sldMk cId="2386745485" sldId="261"/>
+        </pc:sldMkLst>
+        <pc:spChg chg="mod">
+          <ac:chgData name="Ocean Graham" userId="c784d4c6-724f-4452-8baf-8c216b3c246d" providerId="ADAL" clId="{0208D28F-4B44-44FE-A743-3A5E11BBCB5A}" dt="2025-02-11T11:51:40.941" v="362" actId="20577"/>
+          <ac:spMkLst>
+            <pc:docMk/>
+            <pc:sldMk cId="2386745485" sldId="261"/>
+            <ac:spMk id="2" creationId="{77B617F0-D53B-48C9-9C66-D170FA82866E}"/>
+          </ac:spMkLst>
+        </pc:spChg>
+        <pc:spChg chg="del">
+          <ac:chgData name="Ocean Graham" userId="c784d4c6-724f-4452-8baf-8c216b3c246d" providerId="ADAL" clId="{0208D28F-4B44-44FE-A743-3A5E11BBCB5A}" dt="2025-02-11T11:51:49.512" v="363" actId="931"/>
+          <ac:spMkLst>
+            <pc:docMk/>
+            <pc:sldMk cId="2386745485" sldId="261"/>
+            <ac:spMk id="3" creationId="{2AB76DEA-51F3-7F11-ABA5-332BBC510BB5}"/>
+          </ac:spMkLst>
+        </pc:spChg>
+        <pc:spChg chg="add mod">
+          <ac:chgData name="Ocean Graham" userId="c784d4c6-724f-4452-8baf-8c216b3c246d" providerId="ADAL" clId="{0208D28F-4B44-44FE-A743-3A5E11BBCB5A}" dt="2025-02-11T11:54:21.111" v="500" actId="20577"/>
+          <ac:spMkLst>
+            <pc:docMk/>
+            <pc:sldMk cId="2386745485" sldId="261"/>
+            <ac:spMk id="10" creationId="{8DEF39C4-29E1-C068-B0F9-83F8F3689295}"/>
+          </ac:spMkLst>
+        </pc:spChg>
+        <pc:picChg chg="add mod">
+          <ac:chgData name="Ocean Graham" userId="c784d4c6-724f-4452-8baf-8c216b3c246d" providerId="ADAL" clId="{0208D28F-4B44-44FE-A743-3A5E11BBCB5A}" dt="2025-02-11T11:53:14.214" v="368" actId="1076"/>
+          <ac:picMkLst>
+            <pc:docMk/>
+            <pc:sldMk cId="2386745485" sldId="261"/>
+            <ac:picMk id="5" creationId="{1669D17D-EB36-5D87-3912-18D1C8CD49E7}"/>
+          </ac:picMkLst>
+        </pc:picChg>
+        <pc:picChg chg="add mod">
+          <ac:chgData name="Ocean Graham" userId="c784d4c6-724f-4452-8baf-8c216b3c246d" providerId="ADAL" clId="{0208D28F-4B44-44FE-A743-3A5E11BBCB5A}" dt="2025-02-11T11:53:27.461" v="372" actId="1076"/>
+          <ac:picMkLst>
+            <pc:docMk/>
+            <pc:sldMk cId="2386745485" sldId="261"/>
+            <ac:picMk id="7" creationId="{0F73C773-5602-E286-FFF1-CD13F772E2FD}"/>
+          </ac:picMkLst>
+        </pc:picChg>
+        <pc:picChg chg="add mod">
+          <ac:chgData name="Ocean Graham" userId="c784d4c6-724f-4452-8baf-8c216b3c246d" providerId="ADAL" clId="{0208D28F-4B44-44FE-A743-3A5E11BBCB5A}" dt="2025-02-11T11:53:45.245" v="378" actId="1076"/>
+          <ac:picMkLst>
+            <pc:docMk/>
+            <pc:sldMk cId="2386745485" sldId="261"/>
+            <ac:picMk id="9" creationId="{B452DE78-649E-F3C0-63EF-C57F62408905}"/>
+          </ac:picMkLst>
+        </pc:picChg>
+      </pc:sldChg>
+      <pc:sldChg chg="addSp delSp modSp new mod">
+        <pc:chgData name="Ocean Graham" userId="c784d4c6-724f-4452-8baf-8c216b3c246d" providerId="ADAL" clId="{0208D28F-4B44-44FE-A743-3A5E11BBCB5A}" dt="2025-02-11T12:05:12.386" v="566" actId="14100"/>
+        <pc:sldMkLst>
+          <pc:docMk/>
+          <pc:sldMk cId="2756231743" sldId="262"/>
+        </pc:sldMkLst>
+        <pc:spChg chg="mod">
+          <ac:chgData name="Ocean Graham" userId="c784d4c6-724f-4452-8baf-8c216b3c246d" providerId="ADAL" clId="{0208D28F-4B44-44FE-A743-3A5E11BBCB5A}" dt="2025-02-11T12:04:31.349" v="556" actId="20577"/>
+          <ac:spMkLst>
+            <pc:docMk/>
+            <pc:sldMk cId="2756231743" sldId="262"/>
+            <ac:spMk id="2" creationId="{95280F2E-8B48-E83A-BB71-784428C718D8}"/>
+          </ac:spMkLst>
+        </pc:spChg>
+        <pc:spChg chg="del">
+          <ac:chgData name="Ocean Graham" userId="c784d4c6-724f-4452-8baf-8c216b3c246d" providerId="ADAL" clId="{0208D28F-4B44-44FE-A743-3A5E11BBCB5A}" dt="2025-02-11T12:04:48.953" v="557" actId="931"/>
+          <ac:spMkLst>
+            <pc:docMk/>
+            <pc:sldMk cId="2756231743" sldId="262"/>
+            <ac:spMk id="3" creationId="{A42FD5D1-EF88-1B34-CCA3-4E48B038A1AB}"/>
+          </ac:spMkLst>
+        </pc:spChg>
+        <pc:picChg chg="add mod">
+          <ac:chgData name="Ocean Graham" userId="c784d4c6-724f-4452-8baf-8c216b3c246d" providerId="ADAL" clId="{0208D28F-4B44-44FE-A743-3A5E11BBCB5A}" dt="2025-02-11T12:04:54.020" v="561" actId="1076"/>
+          <ac:picMkLst>
+            <pc:docMk/>
+            <pc:sldMk cId="2756231743" sldId="262"/>
+            <ac:picMk id="5" creationId="{2D741AC3-CACC-29A2-1EA8-708929B70032}"/>
+          </ac:picMkLst>
+        </pc:picChg>
+        <pc:picChg chg="add mod">
+          <ac:chgData name="Ocean Graham" userId="c784d4c6-724f-4452-8baf-8c216b3c246d" providerId="ADAL" clId="{0208D28F-4B44-44FE-A743-3A5E11BBCB5A}" dt="2025-02-11T12:05:12.386" v="566" actId="14100"/>
+          <ac:picMkLst>
+            <pc:docMk/>
+            <pc:sldMk cId="2756231743" sldId="262"/>
+            <ac:picMk id="7" creationId="{6BA306A6-1AE4-0A4E-45DA-5E729CF567AF}"/>
+          </ac:picMkLst>
+        </pc:picChg>
+      </pc:sldChg>
+      <pc:sldChg chg="addSp delSp modSp new mod">
+        <pc:chgData name="Ocean Graham" userId="c784d4c6-724f-4452-8baf-8c216b3c246d" providerId="ADAL" clId="{0208D28F-4B44-44FE-A743-3A5E11BBCB5A}" dt="2025-02-11T12:14:40.225" v="632" actId="1076"/>
+        <pc:sldMkLst>
+          <pc:docMk/>
+          <pc:sldMk cId="264119337" sldId="263"/>
+        </pc:sldMkLst>
+        <pc:spChg chg="mod">
+          <ac:chgData name="Ocean Graham" userId="c784d4c6-724f-4452-8baf-8c216b3c246d" providerId="ADAL" clId="{0208D28F-4B44-44FE-A743-3A5E11BBCB5A}" dt="2025-02-11T12:14:09.241" v="621" actId="27636"/>
+          <ac:spMkLst>
+            <pc:docMk/>
+            <pc:sldMk cId="264119337" sldId="263"/>
+            <ac:spMk id="2" creationId="{2A2C4AA6-3DEB-D10E-949C-021FC16C78C5}"/>
+          </ac:spMkLst>
+        </pc:spChg>
+        <pc:spChg chg="del">
+          <ac:chgData name="Ocean Graham" userId="c784d4c6-724f-4452-8baf-8c216b3c246d" providerId="ADAL" clId="{0208D28F-4B44-44FE-A743-3A5E11BBCB5A}" dt="2025-02-11T12:14:19.294" v="622" actId="931"/>
+          <ac:spMkLst>
+            <pc:docMk/>
+            <pc:sldMk cId="264119337" sldId="263"/>
+            <ac:spMk id="3" creationId="{967CEE1B-C390-8B27-E615-5E206D8ACD9D}"/>
+          </ac:spMkLst>
+        </pc:spChg>
+        <pc:picChg chg="add mod ord">
+          <ac:chgData name="Ocean Graham" userId="c784d4c6-724f-4452-8baf-8c216b3c246d" providerId="ADAL" clId="{0208D28F-4B44-44FE-A743-3A5E11BBCB5A}" dt="2025-02-11T12:14:40.225" v="632" actId="1076"/>
+          <ac:picMkLst>
+            <pc:docMk/>
+            <pc:sldMk cId="264119337" sldId="263"/>
+            <ac:picMk id="5" creationId="{438D63E5-DDC9-0AF5-8A8F-A6CEACD8BE77}"/>
+          </ac:picMkLst>
+        </pc:picChg>
+        <pc:picChg chg="add mod">
+          <ac:chgData name="Ocean Graham" userId="c784d4c6-724f-4452-8baf-8c216b3c246d" providerId="ADAL" clId="{0208D28F-4B44-44FE-A743-3A5E11BBCB5A}" dt="2025-02-11T12:14:36.597" v="630" actId="1076"/>
+          <ac:picMkLst>
+            <pc:docMk/>
+            <pc:sldMk cId="264119337" sldId="263"/>
+            <ac:picMk id="7" creationId="{7A4C35D9-2748-56B6-BF4B-D33540234919}"/>
+          </ac:picMkLst>
+        </pc:picChg>
+      </pc:sldChg>
+      <pc:sldChg chg="addSp delSp modSp new mod">
+        <pc:chgData name="Ocean Graham" userId="c784d4c6-724f-4452-8baf-8c216b3c246d" providerId="ADAL" clId="{0208D28F-4B44-44FE-A743-3A5E11BBCB5A}" dt="2025-02-11T12:18:53.758" v="654" actId="1076"/>
+        <pc:sldMkLst>
+          <pc:docMk/>
+          <pc:sldMk cId="1461443829" sldId="264"/>
+        </pc:sldMkLst>
+        <pc:spChg chg="mod">
+          <ac:chgData name="Ocean Graham" userId="c784d4c6-724f-4452-8baf-8c216b3c246d" providerId="ADAL" clId="{0208D28F-4B44-44FE-A743-3A5E11BBCB5A}" dt="2025-02-11T12:18:21.368" v="645" actId="20577"/>
+          <ac:spMkLst>
+            <pc:docMk/>
+            <pc:sldMk cId="1461443829" sldId="264"/>
+            <ac:spMk id="2" creationId="{66FAD390-0729-2587-910F-C8589ECE86D1}"/>
+          </ac:spMkLst>
+        </pc:spChg>
+        <pc:spChg chg="del">
+          <ac:chgData name="Ocean Graham" userId="c784d4c6-724f-4452-8baf-8c216b3c246d" providerId="ADAL" clId="{0208D28F-4B44-44FE-A743-3A5E11BBCB5A}" dt="2025-02-11T12:18:32.499" v="646" actId="931"/>
+          <ac:spMkLst>
+            <pc:docMk/>
+            <pc:sldMk cId="1461443829" sldId="264"/>
+            <ac:spMk id="3" creationId="{588735C7-C31C-E737-03AE-67F4803B1CC8}"/>
+          </ac:spMkLst>
+        </pc:spChg>
+        <pc:picChg chg="add mod">
+          <ac:chgData name="Ocean Graham" userId="c784d4c6-724f-4452-8baf-8c216b3c246d" providerId="ADAL" clId="{0208D28F-4B44-44FE-A743-3A5E11BBCB5A}" dt="2025-02-11T12:18:36.312" v="650" actId="14100"/>
+          <ac:picMkLst>
+            <pc:docMk/>
+            <pc:sldMk cId="1461443829" sldId="264"/>
+            <ac:picMk id="5" creationId="{9A504311-59E3-9770-19A5-65271EB943A5}"/>
+          </ac:picMkLst>
+        </pc:picChg>
+        <pc:picChg chg="add mod">
+          <ac:chgData name="Ocean Graham" userId="c784d4c6-724f-4452-8baf-8c216b3c246d" providerId="ADAL" clId="{0208D28F-4B44-44FE-A743-3A5E11BBCB5A}" dt="2025-02-11T12:18:53.758" v="654" actId="1076"/>
+          <ac:picMkLst>
+            <pc:docMk/>
+            <pc:sldMk cId="1461443829" sldId="264"/>
+            <ac:picMk id="7" creationId="{B71B9201-67BE-CD32-3442-53E3FA55AC10}"/>
+          </ac:picMkLst>
+        </pc:picChg>
+      </pc:sldChg>
+      <pc:sldChg chg="addSp delSp modSp new mod">
+        <pc:chgData name="Ocean Graham" userId="c784d4c6-724f-4452-8baf-8c216b3c246d" providerId="ADAL" clId="{0208D28F-4B44-44FE-A743-3A5E11BBCB5A}" dt="2025-02-11T12:29:31.157" v="843" actId="1076"/>
+        <pc:sldMkLst>
+          <pc:docMk/>
+          <pc:sldMk cId="795961172" sldId="265"/>
+        </pc:sldMkLst>
+        <pc:spChg chg="mod">
+          <ac:chgData name="Ocean Graham" userId="c784d4c6-724f-4452-8baf-8c216b3c246d" providerId="ADAL" clId="{0208D28F-4B44-44FE-A743-3A5E11BBCB5A}" dt="2025-02-11T12:28:52.373" v="838" actId="20577"/>
+          <ac:spMkLst>
+            <pc:docMk/>
+            <pc:sldMk cId="795961172" sldId="265"/>
+            <ac:spMk id="2" creationId="{81B334E5-20AC-31C4-7F0B-ABA88A836FC5}"/>
+          </ac:spMkLst>
+        </pc:spChg>
+        <pc:spChg chg="del">
+          <ac:chgData name="Ocean Graham" userId="c784d4c6-724f-4452-8baf-8c216b3c246d" providerId="ADAL" clId="{0208D28F-4B44-44FE-A743-3A5E11BBCB5A}" dt="2025-02-11T12:28:00.819" v="728" actId="931"/>
+          <ac:spMkLst>
+            <pc:docMk/>
+            <pc:sldMk cId="795961172" sldId="265"/>
+            <ac:spMk id="3" creationId="{38DF2BED-937D-35E5-4963-2382FA11D36E}"/>
+          </ac:spMkLst>
+        </pc:spChg>
+        <pc:picChg chg="add mod">
+          <ac:chgData name="Ocean Graham" userId="c784d4c6-724f-4452-8baf-8c216b3c246d" providerId="ADAL" clId="{0208D28F-4B44-44FE-A743-3A5E11BBCB5A}" dt="2025-02-11T12:28:48.629" v="824" actId="1076"/>
+          <ac:picMkLst>
+            <pc:docMk/>
+            <pc:sldMk cId="795961172" sldId="265"/>
+            <ac:picMk id="5" creationId="{5E34E970-4892-5624-8784-B08AC722A9C9}"/>
+          </ac:picMkLst>
+        </pc:picChg>
+        <pc:picChg chg="add mod">
+          <ac:chgData name="Ocean Graham" userId="c784d4c6-724f-4452-8baf-8c216b3c246d" providerId="ADAL" clId="{0208D28F-4B44-44FE-A743-3A5E11BBCB5A}" dt="2025-02-11T12:28:46.805" v="823" actId="1076"/>
+          <ac:picMkLst>
+            <pc:docMk/>
+            <pc:sldMk cId="795961172" sldId="265"/>
+            <ac:picMk id="7" creationId="{7E99DDF5-3D01-B06B-E767-42EE25D8BC6D}"/>
+          </ac:picMkLst>
+        </pc:picChg>
+        <pc:picChg chg="add mod">
+          <ac:chgData name="Ocean Graham" userId="c784d4c6-724f-4452-8baf-8c216b3c246d" providerId="ADAL" clId="{0208D28F-4B44-44FE-A743-3A5E11BBCB5A}" dt="2025-02-11T12:29:31.157" v="843" actId="1076"/>
+          <ac:picMkLst>
+            <pc:docMk/>
+            <pc:sldMk cId="795961172" sldId="265"/>
+            <ac:picMk id="9" creationId="{AFCAB13A-2144-9BB1-A6DE-88E08BACC144}"/>
+          </ac:picMkLst>
+        </pc:picChg>
+      </pc:sldChg>
+      <pc:sldChg chg="addSp delSp modSp new mod">
+        <pc:chgData name="Ocean Graham" userId="c784d4c6-724f-4452-8baf-8c216b3c246d" providerId="ADAL" clId="{0208D28F-4B44-44FE-A743-3A5E11BBCB5A}" dt="2025-02-11T12:31:17.125" v="853" actId="1076"/>
+        <pc:sldMkLst>
+          <pc:docMk/>
+          <pc:sldMk cId="2265635517" sldId="266"/>
+        </pc:sldMkLst>
+        <pc:spChg chg="del">
+          <ac:chgData name="Ocean Graham" userId="c784d4c6-724f-4452-8baf-8c216b3c246d" providerId="ADAL" clId="{0208D28F-4B44-44FE-A743-3A5E11BBCB5A}" dt="2025-02-11T12:30:47.622" v="845" actId="931"/>
+          <ac:spMkLst>
+            <pc:docMk/>
+            <pc:sldMk cId="2265635517" sldId="266"/>
+            <ac:spMk id="3" creationId="{0E353A0F-BEEC-6801-6480-6F4D74CD1C21}"/>
+          </ac:spMkLst>
+        </pc:spChg>
+        <pc:picChg chg="add mod">
+          <ac:chgData name="Ocean Graham" userId="c784d4c6-724f-4452-8baf-8c216b3c246d" providerId="ADAL" clId="{0208D28F-4B44-44FE-A743-3A5E11BBCB5A}" dt="2025-02-11T12:30:51.773" v="849" actId="1076"/>
+          <ac:picMkLst>
+            <pc:docMk/>
+            <pc:sldMk cId="2265635517" sldId="266"/>
+            <ac:picMk id="5" creationId="{9003600C-DF63-21C3-D3F8-CBC053104680}"/>
+          </ac:picMkLst>
+        </pc:picChg>
+        <pc:picChg chg="add mod">
+          <ac:chgData name="Ocean Graham" userId="c784d4c6-724f-4452-8baf-8c216b3c246d" providerId="ADAL" clId="{0208D28F-4B44-44FE-A743-3A5E11BBCB5A}" dt="2025-02-11T12:31:17.125" v="853" actId="1076"/>
+          <ac:picMkLst>
+            <pc:docMk/>
+            <pc:sldMk cId="2265635517" sldId="266"/>
+            <ac:picMk id="7" creationId="{CE7BD722-8A6D-2E01-34F1-EDAD4FFADF6F}"/>
+          </ac:picMkLst>
+        </pc:picChg>
+      </pc:sldChg>
+      <pc:sldChg chg="addSp delSp modSp new mod">
+        <pc:chgData name="Ocean Graham" userId="c784d4c6-724f-4452-8baf-8c216b3c246d" providerId="ADAL" clId="{0208D28F-4B44-44FE-A743-3A5E11BBCB5A}" dt="2025-02-11T12:38:19.528" v="992" actId="21"/>
+        <pc:sldMkLst>
+          <pc:docMk/>
+          <pc:sldMk cId="3981447778" sldId="267"/>
+        </pc:sldMkLst>
+        <pc:spChg chg="mod">
+          <ac:chgData name="Ocean Graham" userId="c784d4c6-724f-4452-8baf-8c216b3c246d" providerId="ADAL" clId="{0208D28F-4B44-44FE-A743-3A5E11BBCB5A}" dt="2025-02-11T12:32:50.493" v="909" actId="20577"/>
+          <ac:spMkLst>
+            <pc:docMk/>
+            <pc:sldMk cId="3981447778" sldId="267"/>
+            <ac:spMk id="2" creationId="{5C427E4C-A965-6370-A8B0-F07696A3109C}"/>
+          </ac:spMkLst>
+        </pc:spChg>
+        <pc:spChg chg="del">
+          <ac:chgData name="Ocean Graham" userId="c784d4c6-724f-4452-8baf-8c216b3c246d" providerId="ADAL" clId="{0208D28F-4B44-44FE-A743-3A5E11BBCB5A}" dt="2025-02-11T12:32:40.078" v="866" actId="931"/>
+          <ac:spMkLst>
+            <pc:docMk/>
+            <pc:sldMk cId="3981447778" sldId="267"/>
+            <ac:spMk id="3" creationId="{746FB1BF-0EA0-3F7E-F937-78FEEB02288C}"/>
+          </ac:spMkLst>
+        </pc:spChg>
+        <pc:picChg chg="add mod">
+          <ac:chgData name="Ocean Graham" userId="c784d4c6-724f-4452-8baf-8c216b3c246d" providerId="ADAL" clId="{0208D28F-4B44-44FE-A743-3A5E11BBCB5A}" dt="2025-02-11T12:35:20.365" v="946" actId="14100"/>
+          <ac:picMkLst>
+            <pc:docMk/>
+            <pc:sldMk cId="3981447778" sldId="267"/>
+            <ac:picMk id="5" creationId="{78A4724E-822F-F4A0-6955-10385E6B8810}"/>
+          </ac:picMkLst>
+        </pc:picChg>
+        <pc:picChg chg="add mod">
+          <ac:chgData name="Ocean Graham" userId="c784d4c6-724f-4452-8baf-8c216b3c246d" providerId="ADAL" clId="{0208D28F-4B44-44FE-A743-3A5E11BBCB5A}" dt="2025-02-11T12:36:01.109" v="950" actId="1076"/>
+          <ac:picMkLst>
+            <pc:docMk/>
+            <pc:sldMk cId="3981447778" sldId="267"/>
+            <ac:picMk id="7" creationId="{40A80A38-FE91-E3A8-8972-7C2F3F6038FA}"/>
+          </ac:picMkLst>
+        </pc:picChg>
+        <pc:picChg chg="add mod">
+          <ac:chgData name="Ocean Graham" userId="c784d4c6-724f-4452-8baf-8c216b3c246d" providerId="ADAL" clId="{0208D28F-4B44-44FE-A743-3A5E11BBCB5A}" dt="2025-02-11T12:36:18.237" v="955" actId="14100"/>
+          <ac:picMkLst>
+            <pc:docMk/>
+            <pc:sldMk cId="3981447778" sldId="267"/>
+            <ac:picMk id="9" creationId="{F75110F8-970F-F9A8-C702-78626ED1A42B}"/>
+          </ac:picMkLst>
+        </pc:picChg>
+        <pc:picChg chg="add mod">
+          <ac:chgData name="Ocean Graham" userId="c784d4c6-724f-4452-8baf-8c216b3c246d" providerId="ADAL" clId="{0208D28F-4B44-44FE-A743-3A5E11BBCB5A}" dt="2025-02-11T12:36:14.493" v="954" actId="1076"/>
+          <ac:picMkLst>
+            <pc:docMk/>
+            <pc:sldMk cId="3981447778" sldId="267"/>
+            <ac:picMk id="11" creationId="{1F0BA468-45B5-680B-174D-8E749F3E8E75}"/>
+          </ac:picMkLst>
+        </pc:picChg>
+        <pc:picChg chg="add del mod">
+          <ac:chgData name="Ocean Graham" userId="c784d4c6-724f-4452-8baf-8c216b3c246d" providerId="ADAL" clId="{0208D28F-4B44-44FE-A743-3A5E11BBCB5A}" dt="2025-02-11T12:38:19.528" v="992" actId="21"/>
+          <ac:picMkLst>
+            <pc:docMk/>
+            <pc:sldMk cId="3981447778" sldId="267"/>
+            <ac:picMk id="13" creationId="{877886DF-7160-E0E1-5E35-270B54077050}"/>
+          </ac:picMkLst>
+        </pc:picChg>
+      </pc:sldChg>
+      <pc:sldChg chg="addSp delSp modSp new mod">
+        <pc:chgData name="Ocean Graham" userId="c784d4c6-724f-4452-8baf-8c216b3c246d" providerId="ADAL" clId="{0208D28F-4B44-44FE-A743-3A5E11BBCB5A}" dt="2025-02-11T12:45:29.497" v="1143" actId="166"/>
+        <pc:sldMkLst>
+          <pc:docMk/>
+          <pc:sldMk cId="348271633" sldId="268"/>
+        </pc:sldMkLst>
+        <pc:spChg chg="mod">
+          <ac:chgData name="Ocean Graham" userId="c784d4c6-724f-4452-8baf-8c216b3c246d" providerId="ADAL" clId="{0208D28F-4B44-44FE-A743-3A5E11BBCB5A}" dt="2025-02-11T12:36:27.861" v="989" actId="20577"/>
+          <ac:spMkLst>
+            <pc:docMk/>
+            <pc:sldMk cId="348271633" sldId="268"/>
+            <ac:spMk id="2" creationId="{E464CE87-2CE8-14F5-88EB-B3724908315C}"/>
+          </ac:spMkLst>
+        </pc:spChg>
+        <pc:spChg chg="del">
+          <ac:chgData name="Ocean Graham" userId="c784d4c6-724f-4452-8baf-8c216b3c246d" providerId="ADAL" clId="{0208D28F-4B44-44FE-A743-3A5E11BBCB5A}" dt="2025-02-11T12:38:41.261" v="995" actId="931"/>
+          <ac:spMkLst>
+            <pc:docMk/>
+            <pc:sldMk cId="348271633" sldId="268"/>
+            <ac:spMk id="3" creationId="{B8373F06-4912-7E94-215F-CCF1DB840C3C}"/>
+          </ac:spMkLst>
+        </pc:spChg>
+        <pc:picChg chg="add mod">
+          <ac:chgData name="Ocean Graham" userId="c784d4c6-724f-4452-8baf-8c216b3c246d" providerId="ADAL" clId="{0208D28F-4B44-44FE-A743-3A5E11BBCB5A}" dt="2025-02-11T12:38:25.984" v="994" actId="1076"/>
+          <ac:picMkLst>
+            <pc:docMk/>
+            <pc:sldMk cId="348271633" sldId="268"/>
+            <ac:picMk id="4" creationId="{620C896E-2413-F6A2-9F44-4A7F90F90136}"/>
+          </ac:picMkLst>
+        </pc:picChg>
+        <pc:picChg chg="add mod ord">
+          <ac:chgData name="Ocean Graham" userId="c784d4c6-724f-4452-8baf-8c216b3c246d" providerId="ADAL" clId="{0208D28F-4B44-44FE-A743-3A5E11BBCB5A}" dt="2025-02-11T12:45:29.497" v="1143" actId="166"/>
+          <ac:picMkLst>
+            <pc:docMk/>
+            <pc:sldMk cId="348271633" sldId="268"/>
+            <ac:picMk id="6" creationId="{10618259-4285-5DA4-0F81-B6D128EDF6BE}"/>
+          </ac:picMkLst>
+        </pc:picChg>
+        <pc:picChg chg="add mod">
+          <ac:chgData name="Ocean Graham" userId="c784d4c6-724f-4452-8baf-8c216b3c246d" providerId="ADAL" clId="{0208D28F-4B44-44FE-A743-3A5E11BBCB5A}" dt="2025-02-11T12:39:11.110" v="1001" actId="1076"/>
+          <ac:picMkLst>
+            <pc:docMk/>
+            <pc:sldMk cId="348271633" sldId="268"/>
+            <ac:picMk id="8" creationId="{2F0DF58B-1D8D-2918-371F-47427ADBBC35}"/>
+          </ac:picMkLst>
+        </pc:picChg>
+      </pc:sldChg>
+      <pc:sldChg chg="addSp delSp modSp new mod">
+        <pc:chgData name="Ocean Graham" userId="c784d4c6-724f-4452-8baf-8c216b3c246d" providerId="ADAL" clId="{0208D28F-4B44-44FE-A743-3A5E11BBCB5A}" dt="2025-02-11T12:43:47.141" v="1082" actId="1076"/>
+        <pc:sldMkLst>
+          <pc:docMk/>
+          <pc:sldMk cId="3482844506" sldId="269"/>
+        </pc:sldMkLst>
+        <pc:spChg chg="mod">
+          <ac:chgData name="Ocean Graham" userId="c784d4c6-724f-4452-8baf-8c216b3c246d" providerId="ADAL" clId="{0208D28F-4B44-44FE-A743-3A5E11BBCB5A}" dt="2025-02-11T12:41:09.869" v="1071" actId="20577"/>
+          <ac:spMkLst>
+            <pc:docMk/>
+            <pc:sldMk cId="3482844506" sldId="269"/>
+            <ac:spMk id="2" creationId="{140E01A9-9747-72CF-54E4-4A400D6A464B}"/>
+          </ac:spMkLst>
+        </pc:spChg>
+        <pc:spChg chg="del">
+          <ac:chgData name="Ocean Graham" userId="c784d4c6-724f-4452-8baf-8c216b3c246d" providerId="ADAL" clId="{0208D28F-4B44-44FE-A743-3A5E11BBCB5A}" dt="2025-02-11T12:40:42.154" v="1003" actId="931"/>
+          <ac:spMkLst>
+            <pc:docMk/>
+            <pc:sldMk cId="3482844506" sldId="269"/>
+            <ac:spMk id="3" creationId="{D131162B-9143-0351-2453-5328699C94BE}"/>
+          </ac:spMkLst>
+        </pc:spChg>
+        <pc:picChg chg="add mod">
+          <ac:chgData name="Ocean Graham" userId="c784d4c6-724f-4452-8baf-8c216b3c246d" providerId="ADAL" clId="{0208D28F-4B44-44FE-A743-3A5E11BBCB5A}" dt="2025-02-11T12:41:16.109" v="1073" actId="14100"/>
+          <ac:picMkLst>
+            <pc:docMk/>
+            <pc:sldMk cId="3482844506" sldId="269"/>
+            <ac:picMk id="5" creationId="{2BA90DFD-3353-4FF3-C92E-EBD4AC008454}"/>
+          </ac:picMkLst>
+        </pc:picChg>
+        <pc:picChg chg="add mod">
+          <ac:chgData name="Ocean Graham" userId="c784d4c6-724f-4452-8baf-8c216b3c246d" providerId="ADAL" clId="{0208D28F-4B44-44FE-A743-3A5E11BBCB5A}" dt="2025-02-11T12:41:03.629" v="1051" actId="1076"/>
+          <ac:picMkLst>
+            <pc:docMk/>
+            <pc:sldMk cId="3482844506" sldId="269"/>
+            <ac:picMk id="7" creationId="{9C32FB63-D435-9B00-5088-6E6613640066}"/>
+          </ac:picMkLst>
+        </pc:picChg>
+        <pc:picChg chg="add del mod">
+          <ac:chgData name="Ocean Graham" userId="c784d4c6-724f-4452-8baf-8c216b3c246d" providerId="ADAL" clId="{0208D28F-4B44-44FE-A743-3A5E11BBCB5A}" dt="2025-02-11T12:43:22.425" v="1076" actId="21"/>
+          <ac:picMkLst>
+            <pc:docMk/>
+            <pc:sldMk cId="3482844506" sldId="269"/>
+            <ac:picMk id="9" creationId="{07513792-2B0E-4E1E-F9BB-33057151156C}"/>
+          </ac:picMkLst>
+        </pc:picChg>
+        <pc:picChg chg="add mod">
+          <ac:chgData name="Ocean Graham" userId="c784d4c6-724f-4452-8baf-8c216b3c246d" providerId="ADAL" clId="{0208D28F-4B44-44FE-A743-3A5E11BBCB5A}" dt="2025-02-11T12:43:35.830" v="1078" actId="1076"/>
+          <ac:picMkLst>
+            <pc:docMk/>
+            <pc:sldMk cId="3482844506" sldId="269"/>
+            <ac:picMk id="11" creationId="{81771535-324D-F216-EB91-C507D7D66AC6}"/>
+          </ac:picMkLst>
+        </pc:picChg>
+        <pc:picChg chg="add mod">
+          <ac:chgData name="Ocean Graham" userId="c784d4c6-724f-4452-8baf-8c216b3c246d" providerId="ADAL" clId="{0208D28F-4B44-44FE-A743-3A5E11BBCB5A}" dt="2025-02-11T12:43:47.141" v="1082" actId="1076"/>
+          <ac:picMkLst>
+            <pc:docMk/>
+            <pc:sldMk cId="3482844506" sldId="269"/>
+            <ac:picMk id="13" creationId="{C47AD36B-C5B6-4D2D-1CE4-6037A7A118B3}"/>
+          </ac:picMkLst>
+        </pc:picChg>
+      </pc:sldChg>
+      <pc:sldChg chg="addSp delSp modSp new mod">
+        <pc:chgData name="Ocean Graham" userId="c784d4c6-724f-4452-8baf-8c216b3c246d" providerId="ADAL" clId="{0208D28F-4B44-44FE-A743-3A5E11BBCB5A}" dt="2025-02-11T12:45:14.142" v="1141" actId="1076"/>
+        <pc:sldMkLst>
+          <pc:docMk/>
+          <pc:sldMk cId="2869504880" sldId="270"/>
+        </pc:sldMkLst>
+        <pc:spChg chg="mod">
+          <ac:chgData name="Ocean Graham" userId="c784d4c6-724f-4452-8baf-8c216b3c246d" providerId="ADAL" clId="{0208D28F-4B44-44FE-A743-3A5E11BBCB5A}" dt="2025-02-11T12:44:50.773" v="1133" actId="20577"/>
+          <ac:spMkLst>
+            <pc:docMk/>
+            <pc:sldMk cId="2869504880" sldId="270"/>
+            <ac:spMk id="2" creationId="{E65C128A-BADB-A102-6C05-8AE0A813C82B}"/>
+          </ac:spMkLst>
+        </pc:spChg>
+        <pc:spChg chg="del">
+          <ac:chgData name="Ocean Graham" userId="c784d4c6-724f-4452-8baf-8c216b3c246d" providerId="ADAL" clId="{0208D28F-4B44-44FE-A743-3A5E11BBCB5A}" dt="2025-02-11T12:45:01.054" v="1134" actId="931"/>
+          <ac:spMkLst>
+            <pc:docMk/>
+            <pc:sldMk cId="2869504880" sldId="270"/>
+            <ac:spMk id="3" creationId="{7D53604B-3B0D-6512-A330-7DBC1913B2B6}"/>
+          </ac:spMkLst>
+        </pc:spChg>
+        <pc:picChg chg="add mod">
+          <ac:chgData name="Ocean Graham" userId="c784d4c6-724f-4452-8baf-8c216b3c246d" providerId="ADAL" clId="{0208D28F-4B44-44FE-A743-3A5E11BBCB5A}" dt="2025-02-11T12:45:02.508" v="1137" actId="1076"/>
+          <ac:picMkLst>
+            <pc:docMk/>
+            <pc:sldMk cId="2869504880" sldId="270"/>
+            <ac:picMk id="5" creationId="{B3827F06-8E40-E906-837B-7FCC8916524F}"/>
+          </ac:picMkLst>
+        </pc:picChg>
+        <pc:picChg chg="add mod">
+          <ac:chgData name="Ocean Graham" userId="c784d4c6-724f-4452-8baf-8c216b3c246d" providerId="ADAL" clId="{0208D28F-4B44-44FE-A743-3A5E11BBCB5A}" dt="2025-02-11T12:45:14.142" v="1141" actId="1076"/>
+          <ac:picMkLst>
+            <pc:docMk/>
+            <pc:sldMk cId="2869504880" sldId="270"/>
+            <ac:picMk id="7" creationId="{18C5B452-17C2-A4E3-0897-EF3951CB52A6}"/>
+          </ac:picMkLst>
+        </pc:picChg>
+      </pc:sldChg>
+      <pc:sldChg chg="modSp new mod">
+        <pc:chgData name="Ocean Graham" userId="c784d4c6-724f-4452-8baf-8c216b3c246d" providerId="ADAL" clId="{0208D28F-4B44-44FE-A743-3A5E11BBCB5A}" dt="2025-02-11T12:48:51.541" v="1202" actId="20577"/>
+        <pc:sldMkLst>
+          <pc:docMk/>
+          <pc:sldMk cId="693211685" sldId="271"/>
+        </pc:sldMkLst>
+        <pc:spChg chg="mod">
+          <ac:chgData name="Ocean Graham" userId="c784d4c6-724f-4452-8baf-8c216b3c246d" providerId="ADAL" clId="{0208D28F-4B44-44FE-A743-3A5E11BBCB5A}" dt="2025-02-11T12:48:51.541" v="1202" actId="20577"/>
+          <ac:spMkLst>
+            <pc:docMk/>
+            <pc:sldMk cId="693211685" sldId="271"/>
+            <ac:spMk id="2" creationId="{3E9B125B-206A-78DC-14CE-FAC6EC0DBE27}"/>
+          </ac:spMkLst>
+        </pc:spChg>
+      </pc:sldChg>
+      <pc:sldChg chg="modSp new mod">
+        <pc:chgData name="Ocean Graham" userId="c784d4c6-724f-4452-8baf-8c216b3c246d" providerId="ADAL" clId="{0208D28F-4B44-44FE-A743-3A5E11BBCB5A}" dt="2025-02-11T12:49:05.437" v="1265" actId="20577"/>
+        <pc:sldMkLst>
+          <pc:docMk/>
+          <pc:sldMk cId="657420005" sldId="272"/>
+        </pc:sldMkLst>
+        <pc:spChg chg="mod">
+          <ac:chgData name="Ocean Graham" userId="c784d4c6-724f-4452-8baf-8c216b3c246d" providerId="ADAL" clId="{0208D28F-4B44-44FE-A743-3A5E11BBCB5A}" dt="2025-02-11T12:49:05.437" v="1265" actId="20577"/>
+          <ac:spMkLst>
+            <pc:docMk/>
+            <pc:sldMk cId="657420005" sldId="272"/>
+            <ac:spMk id="2" creationId="{37266345-BBE7-B2C2-2E4A-B54011B4A0EF}"/>
+          </ac:spMkLst>
+        </pc:spChg>
+      </pc:sldChg>
+      <pc:sldChg chg="addSp delSp modSp new mod">
+        <pc:chgData name="Ocean Graham" userId="c784d4c6-724f-4452-8baf-8c216b3c246d" providerId="ADAL" clId="{0208D28F-4B44-44FE-A743-3A5E11BBCB5A}" dt="2025-02-11T12:50:28.613" v="1292" actId="1076"/>
+        <pc:sldMkLst>
+          <pc:docMk/>
+          <pc:sldMk cId="1285068734" sldId="273"/>
+        </pc:sldMkLst>
+        <pc:spChg chg="mod">
+          <ac:chgData name="Ocean Graham" userId="c784d4c6-724f-4452-8baf-8c216b3c246d" providerId="ADAL" clId="{0208D28F-4B44-44FE-A743-3A5E11BBCB5A}" dt="2025-02-11T12:50:13.654" v="1285" actId="20577"/>
+          <ac:spMkLst>
+            <pc:docMk/>
+            <pc:sldMk cId="1285068734" sldId="273"/>
+            <ac:spMk id="2" creationId="{DA64C076-DCE3-7941-A173-61A10E7A54DA}"/>
+          </ac:spMkLst>
+        </pc:spChg>
+        <pc:spChg chg="del">
+          <ac:chgData name="Ocean Graham" userId="c784d4c6-724f-4452-8baf-8c216b3c246d" providerId="ADAL" clId="{0208D28F-4B44-44FE-A743-3A5E11BBCB5A}" dt="2025-02-11T12:50:23.333" v="1286" actId="931"/>
+          <ac:spMkLst>
+            <pc:docMk/>
+            <pc:sldMk cId="1285068734" sldId="273"/>
+            <ac:spMk id="3" creationId="{EE396259-0702-5EF6-C4FA-4665AF4E28E0}"/>
+          </ac:spMkLst>
+        </pc:spChg>
+        <pc:picChg chg="add mod">
+          <ac:chgData name="Ocean Graham" userId="c784d4c6-724f-4452-8baf-8c216b3c246d" providerId="ADAL" clId="{0208D28F-4B44-44FE-A743-3A5E11BBCB5A}" dt="2025-02-11T12:50:28.613" v="1292" actId="1076"/>
+          <ac:picMkLst>
+            <pc:docMk/>
+            <pc:sldMk cId="1285068734" sldId="273"/>
+            <ac:picMk id="5" creationId="{E0DD45C2-9696-7E38-7D7E-3A125E9E6AFE}"/>
+          </ac:picMkLst>
+        </pc:picChg>
+      </pc:sldChg>
+    </pc:docChg>
+  </pc:docChgLst>
+</pc:chgInfo>
 </file>
 
 <file path=ppt/slideLayouts/slideLayout1.xml><?xml version="1.0" encoding="utf-8"?>
@@ -255,7 +1009,7 @@
           <a:p>
             <a:fld id="{8A6CCB4F-FD99-4315-B2E8-E8D8A03023CD}" type="datetimeFigureOut">
               <a:rPr lang="en-GB" smtClean="0"/>
-              <a:t>10/02/2025</a:t>
+              <a:t>11/02/2025</a:t>
             </a:fld>
             <a:endParaRPr lang="en-GB"/>
           </a:p>
@@ -453,7 +1207,7 @@
           <a:p>
             <a:fld id="{8A6CCB4F-FD99-4315-B2E8-E8D8A03023CD}" type="datetimeFigureOut">
               <a:rPr lang="en-GB" smtClean="0"/>
-              <a:t>10/02/2025</a:t>
+              <a:t>11/02/2025</a:t>
             </a:fld>
             <a:endParaRPr lang="en-GB"/>
           </a:p>
@@ -661,7 +1415,7 @@
           <a:p>
             <a:fld id="{8A6CCB4F-FD99-4315-B2E8-E8D8A03023CD}" type="datetimeFigureOut">
               <a:rPr lang="en-GB" smtClean="0"/>
-              <a:t>10/02/2025</a:t>
+              <a:t>11/02/2025</a:t>
             </a:fld>
             <a:endParaRPr lang="en-GB"/>
           </a:p>
@@ -859,7 +1613,7 @@
           <a:p>
             <a:fld id="{8A6CCB4F-FD99-4315-B2E8-E8D8A03023CD}" type="datetimeFigureOut">
               <a:rPr lang="en-GB" smtClean="0"/>
-              <a:t>10/02/2025</a:t>
+              <a:t>11/02/2025</a:t>
             </a:fld>
             <a:endParaRPr lang="en-GB"/>
           </a:p>
@@ -1134,7 +1888,7 @@
           <a:p>
             <a:fld id="{8A6CCB4F-FD99-4315-B2E8-E8D8A03023CD}" type="datetimeFigureOut">
               <a:rPr lang="en-GB" smtClean="0"/>
-              <a:t>10/02/2025</a:t>
+              <a:t>11/02/2025</a:t>
             </a:fld>
             <a:endParaRPr lang="en-GB"/>
           </a:p>
@@ -1399,7 +2153,7 @@
           <a:p>
             <a:fld id="{8A6CCB4F-FD99-4315-B2E8-E8D8A03023CD}" type="datetimeFigureOut">
               <a:rPr lang="en-GB" smtClean="0"/>
-              <a:t>10/02/2025</a:t>
+              <a:t>11/02/2025</a:t>
             </a:fld>
             <a:endParaRPr lang="en-GB"/>
           </a:p>
@@ -1811,7 +2565,7 @@
           <a:p>
             <a:fld id="{8A6CCB4F-FD99-4315-B2E8-E8D8A03023CD}" type="datetimeFigureOut">
               <a:rPr lang="en-GB" smtClean="0"/>
-              <a:t>10/02/2025</a:t>
+              <a:t>11/02/2025</a:t>
             </a:fld>
             <a:endParaRPr lang="en-GB"/>
           </a:p>
@@ -1952,7 +2706,7 @@
           <a:p>
             <a:fld id="{8A6CCB4F-FD99-4315-B2E8-E8D8A03023CD}" type="datetimeFigureOut">
               <a:rPr lang="en-GB" smtClean="0"/>
-              <a:t>10/02/2025</a:t>
+              <a:t>11/02/2025</a:t>
             </a:fld>
             <a:endParaRPr lang="en-GB"/>
           </a:p>
@@ -2065,7 +2819,7 @@
           <a:p>
             <a:fld id="{8A6CCB4F-FD99-4315-B2E8-E8D8A03023CD}" type="datetimeFigureOut">
               <a:rPr lang="en-GB" smtClean="0"/>
-              <a:t>10/02/2025</a:t>
+              <a:t>11/02/2025</a:t>
             </a:fld>
             <a:endParaRPr lang="en-GB"/>
           </a:p>
@@ -2376,7 +3130,7 @@
           <a:p>
             <a:fld id="{8A6CCB4F-FD99-4315-B2E8-E8D8A03023CD}" type="datetimeFigureOut">
               <a:rPr lang="en-GB" smtClean="0"/>
-              <a:t>10/02/2025</a:t>
+              <a:t>11/02/2025</a:t>
             </a:fld>
             <a:endParaRPr lang="en-GB"/>
           </a:p>
@@ -2664,7 +3418,7 @@
           <a:p>
             <a:fld id="{8A6CCB4F-FD99-4315-B2E8-E8D8A03023CD}" type="datetimeFigureOut">
               <a:rPr lang="en-GB" smtClean="0"/>
-              <a:t>10/02/2025</a:t>
+              <a:t>11/02/2025</a:t>
             </a:fld>
             <a:endParaRPr lang="en-GB"/>
           </a:p>
@@ -2905,7 +3659,7 @@
           <a:p>
             <a:fld id="{8A6CCB4F-FD99-4315-B2E8-E8D8A03023CD}" type="datetimeFigureOut">
               <a:rPr lang="en-GB" smtClean="0"/>
-              <a:t>10/02/2025</a:t>
+              <a:t>11/02/2025</a:t>
             </a:fld>
             <a:endParaRPr lang="en-GB"/>
           </a:p>
@@ -3403,6 +4157,1255 @@
 </p:sld>
 </file>
 
+<file path=ppt/slides/slide10.xml><?xml version="1.0" encoding="utf-8"?>
+<p:sld xmlns:a="http://schemas.openxmlformats.org/drawingml/2006/main" xmlns:r="http://schemas.openxmlformats.org/officeDocument/2006/relationships" xmlns:p="http://schemas.openxmlformats.org/presentationml/2006/main">
+  <p:cSld>
+    <p:spTree>
+      <p:nvGrpSpPr>
+        <p:cNvPr id="1" name=""/>
+        <p:cNvGrpSpPr/>
+        <p:nvPr/>
+      </p:nvGrpSpPr>
+      <p:grpSpPr>
+        <a:xfrm>
+          <a:off x="0" y="0"/>
+          <a:ext cx="0" cy="0"/>
+          <a:chOff x="0" y="0"/>
+          <a:chExt cx="0" cy="0"/>
+        </a:xfrm>
+      </p:grpSpPr>
+      <p:sp>
+        <p:nvSpPr>
+          <p:cNvPr id="2" name="Title 1">
+            <a:extLst>
+              <a:ext uri="{FF2B5EF4-FFF2-40B4-BE49-F238E27FC236}">
+                <a16:creationId xmlns:a16="http://schemas.microsoft.com/office/drawing/2014/main" id="{81B334E5-20AC-31C4-7F0B-ABA88A836FC5}"/>
+              </a:ext>
+            </a:extLst>
+          </p:cNvPr>
+          <p:cNvSpPr>
+            <a:spLocks noGrp="1"/>
+          </p:cNvSpPr>
+          <p:nvPr>
+            <p:ph type="title"/>
+          </p:nvPr>
+        </p:nvSpPr>
+        <p:spPr/>
+        <p:txBody>
+          <a:bodyPr>
+            <a:normAutofit fontScale="90000"/>
+          </a:bodyPr>
+          <a:lstStyle/>
+          <a:p>
+            <a:r>
+              <a:rPr lang="en-GB" dirty="0"/>
+              <a:t>Added a loop to repeat the entire process</a:t>
+            </a:r>
+            <a:br>
+              <a:rPr lang="en-GB" dirty="0"/>
+            </a:br>
+            <a:r>
+              <a:rPr lang="en-GB" dirty="0"/>
+              <a:t>issue, bill doesn’t reset. Everything gets tabbed out to make second loop function, 2 while true</a:t>
+            </a:r>
+          </a:p>
+        </p:txBody>
+      </p:sp>
+      <p:pic>
+        <p:nvPicPr>
+          <p:cNvPr id="5" name="Content Placeholder 4" descr="A white background with text&#10;&#10;AI-generated content may be incorrect.">
+            <a:extLst>
+              <a:ext uri="{FF2B5EF4-FFF2-40B4-BE49-F238E27FC236}">
+                <a16:creationId xmlns:a16="http://schemas.microsoft.com/office/drawing/2014/main" id="{5E34E970-4892-5624-8784-B08AC722A9C9}"/>
+              </a:ext>
+            </a:extLst>
+          </p:cNvPr>
+          <p:cNvPicPr>
+            <a:picLocks noGrp="1" noChangeAspect="1"/>
+          </p:cNvPicPr>
+          <p:nvPr>
+            <p:ph idx="1"/>
+          </p:nvPr>
+        </p:nvPicPr>
+        <p:blipFill>
+          <a:blip r:embed="rId2">
+            <a:extLst>
+              <a:ext uri="{28A0092B-C50C-407E-A947-70E740481C1C}">
+                <a14:useLocalDpi xmlns:a14="http://schemas.microsoft.com/office/drawing/2010/main" val="0"/>
+              </a:ext>
+            </a:extLst>
+          </a:blip>
+          <a:stretch>
+            <a:fillRect/>
+          </a:stretch>
+        </p:blipFill>
+        <p:spPr>
+          <a:xfrm>
+            <a:off x="376229" y="4930557"/>
+            <a:ext cx="6620799" cy="1562318"/>
+          </a:xfrm>
+        </p:spPr>
+      </p:pic>
+      <p:pic>
+        <p:nvPicPr>
+          <p:cNvPr id="7" name="Picture 6" descr="A screen shot of a computer code&#10;&#10;AI-generated content may be incorrect.">
+            <a:extLst>
+              <a:ext uri="{FF2B5EF4-FFF2-40B4-BE49-F238E27FC236}">
+                <a16:creationId xmlns:a16="http://schemas.microsoft.com/office/drawing/2014/main" id="{7E99DDF5-3D01-B06B-E767-42EE25D8BC6D}"/>
+              </a:ext>
+            </a:extLst>
+          </p:cNvPr>
+          <p:cNvPicPr>
+            <a:picLocks noChangeAspect="1"/>
+          </p:cNvPicPr>
+          <p:nvPr/>
+        </p:nvPicPr>
+        <p:blipFill>
+          <a:blip r:embed="rId3">
+            <a:extLst>
+              <a:ext uri="{28A0092B-C50C-407E-A947-70E740481C1C}">
+                <a14:useLocalDpi xmlns:a14="http://schemas.microsoft.com/office/drawing/2010/main" val="0"/>
+              </a:ext>
+            </a:extLst>
+          </a:blip>
+          <a:stretch>
+            <a:fillRect/>
+          </a:stretch>
+        </p:blipFill>
+        <p:spPr>
+          <a:xfrm>
+            <a:off x="671631" y="1821354"/>
+            <a:ext cx="4810796" cy="2734057"/>
+          </a:xfrm>
+          <a:prstGeom prst="rect">
+            <a:avLst/>
+          </a:prstGeom>
+        </p:spPr>
+      </p:pic>
+      <p:pic>
+        <p:nvPicPr>
+          <p:cNvPr id="9" name="Picture 8" descr="A screenshot of a computer&#10;&#10;AI-generated content may be incorrect.">
+            <a:extLst>
+              <a:ext uri="{FF2B5EF4-FFF2-40B4-BE49-F238E27FC236}">
+                <a16:creationId xmlns:a16="http://schemas.microsoft.com/office/drawing/2014/main" id="{AFCAB13A-2144-9BB1-A6DE-88E08BACC144}"/>
+              </a:ext>
+            </a:extLst>
+          </p:cNvPr>
+          <p:cNvPicPr>
+            <a:picLocks noChangeAspect="1"/>
+          </p:cNvPicPr>
+          <p:nvPr/>
+        </p:nvPicPr>
+        <p:blipFill>
+          <a:blip r:embed="rId4">
+            <a:extLst>
+              <a:ext uri="{28A0092B-C50C-407E-A947-70E740481C1C}">
+                <a14:useLocalDpi xmlns:a14="http://schemas.microsoft.com/office/drawing/2010/main" val="0"/>
+              </a:ext>
+            </a:extLst>
+          </a:blip>
+          <a:stretch>
+            <a:fillRect/>
+          </a:stretch>
+        </p:blipFill>
+        <p:spPr>
+          <a:xfrm>
+            <a:off x="6475011" y="1927443"/>
+            <a:ext cx="4396189" cy="4162892"/>
+          </a:xfrm>
+          <a:prstGeom prst="rect">
+            <a:avLst/>
+          </a:prstGeom>
+        </p:spPr>
+      </p:pic>
+    </p:spTree>
+    <p:extLst>
+      <p:ext uri="{BB962C8B-B14F-4D97-AF65-F5344CB8AC3E}">
+        <p14:creationId xmlns:p14="http://schemas.microsoft.com/office/powerpoint/2010/main" val="795961172"/>
+      </p:ext>
+    </p:extLst>
+  </p:cSld>
+  <p:clrMapOvr>
+    <a:masterClrMapping/>
+  </p:clrMapOvr>
+</p:sld>
+</file>
+
+<file path=ppt/slides/slide11.xml><?xml version="1.0" encoding="utf-8"?>
+<p:sld xmlns:a="http://schemas.openxmlformats.org/drawingml/2006/main" xmlns:r="http://schemas.openxmlformats.org/officeDocument/2006/relationships" xmlns:p="http://schemas.openxmlformats.org/presentationml/2006/main">
+  <p:cSld>
+    <p:spTree>
+      <p:nvGrpSpPr>
+        <p:cNvPr id="1" name=""/>
+        <p:cNvGrpSpPr/>
+        <p:nvPr/>
+      </p:nvGrpSpPr>
+      <p:grpSpPr>
+        <a:xfrm>
+          <a:off x="0" y="0"/>
+          <a:ext cx="0" cy="0"/>
+          <a:chOff x="0" y="0"/>
+          <a:chExt cx="0" cy="0"/>
+        </a:xfrm>
+      </p:grpSpPr>
+      <p:sp>
+        <p:nvSpPr>
+          <p:cNvPr id="2" name="Title 1">
+            <a:extLst>
+              <a:ext uri="{FF2B5EF4-FFF2-40B4-BE49-F238E27FC236}">
+                <a16:creationId xmlns:a16="http://schemas.microsoft.com/office/drawing/2014/main" id="{1301452F-E280-E878-83A1-516C798CF887}"/>
+              </a:ext>
+            </a:extLst>
+          </p:cNvPr>
+          <p:cNvSpPr>
+            <a:spLocks noGrp="1"/>
+          </p:cNvSpPr>
+          <p:nvPr>
+            <p:ph type="title"/>
+          </p:nvPr>
+        </p:nvSpPr>
+        <p:spPr/>
+        <p:txBody>
+          <a:bodyPr/>
+          <a:lstStyle/>
+          <a:p>
+            <a:endParaRPr lang="en-GB"/>
+          </a:p>
+        </p:txBody>
+      </p:sp>
+      <p:pic>
+        <p:nvPicPr>
+          <p:cNvPr id="5" name="Content Placeholder 4" descr="A screenshot of a computer code&#10;&#10;AI-generated content may be incorrect.">
+            <a:extLst>
+              <a:ext uri="{FF2B5EF4-FFF2-40B4-BE49-F238E27FC236}">
+                <a16:creationId xmlns:a16="http://schemas.microsoft.com/office/drawing/2014/main" id="{9003600C-DF63-21C3-D3F8-CBC053104680}"/>
+              </a:ext>
+            </a:extLst>
+          </p:cNvPr>
+          <p:cNvPicPr>
+            <a:picLocks noGrp="1" noChangeAspect="1"/>
+          </p:cNvPicPr>
+          <p:nvPr>
+            <p:ph idx="1"/>
+          </p:nvPr>
+        </p:nvPicPr>
+        <p:blipFill>
+          <a:blip r:embed="rId2">
+            <a:extLst>
+              <a:ext uri="{28A0092B-C50C-407E-A947-70E740481C1C}">
+                <a14:useLocalDpi xmlns:a14="http://schemas.microsoft.com/office/drawing/2010/main" val="0"/>
+              </a:ext>
+            </a:extLst>
+          </a:blip>
+          <a:stretch>
+            <a:fillRect/>
+          </a:stretch>
+        </p:blipFill>
+        <p:spPr>
+          <a:xfrm>
+            <a:off x="469512" y="1993164"/>
+            <a:ext cx="4260718" cy="1853121"/>
+          </a:xfrm>
+        </p:spPr>
+      </p:pic>
+      <p:pic>
+        <p:nvPicPr>
+          <p:cNvPr id="7" name="Picture 6" descr="A screenshot of a computer&#10;&#10;AI-generated content may be incorrect.">
+            <a:extLst>
+              <a:ext uri="{FF2B5EF4-FFF2-40B4-BE49-F238E27FC236}">
+                <a16:creationId xmlns:a16="http://schemas.microsoft.com/office/drawing/2014/main" id="{CE7BD722-8A6D-2E01-34F1-EDAD4FFADF6F}"/>
+              </a:ext>
+            </a:extLst>
+          </p:cNvPr>
+          <p:cNvPicPr>
+            <a:picLocks noChangeAspect="1"/>
+          </p:cNvPicPr>
+          <p:nvPr/>
+        </p:nvPicPr>
+        <p:blipFill>
+          <a:blip r:embed="rId3">
+            <a:extLst>
+              <a:ext uri="{28A0092B-C50C-407E-A947-70E740481C1C}">
+                <a14:useLocalDpi xmlns:a14="http://schemas.microsoft.com/office/drawing/2010/main" val="0"/>
+              </a:ext>
+            </a:extLst>
+          </a:blip>
+          <a:stretch>
+            <a:fillRect/>
+          </a:stretch>
+        </p:blipFill>
+        <p:spPr>
+          <a:xfrm>
+            <a:off x="6096000" y="737812"/>
+            <a:ext cx="4744112" cy="5382376"/>
+          </a:xfrm>
+          <a:prstGeom prst="rect">
+            <a:avLst/>
+          </a:prstGeom>
+        </p:spPr>
+      </p:pic>
+    </p:spTree>
+    <p:extLst>
+      <p:ext uri="{BB962C8B-B14F-4D97-AF65-F5344CB8AC3E}">
+        <p14:creationId xmlns:p14="http://schemas.microsoft.com/office/powerpoint/2010/main" val="2265635517"/>
+      </p:ext>
+    </p:extLst>
+  </p:cSld>
+  <p:clrMapOvr>
+    <a:masterClrMapping/>
+  </p:clrMapOvr>
+</p:sld>
+</file>
+
+<file path=ppt/slides/slide12.xml><?xml version="1.0" encoding="utf-8"?>
+<p:sld xmlns:a="http://schemas.openxmlformats.org/drawingml/2006/main" xmlns:r="http://schemas.openxmlformats.org/officeDocument/2006/relationships" xmlns:p="http://schemas.openxmlformats.org/presentationml/2006/main">
+  <p:cSld>
+    <p:spTree>
+      <p:nvGrpSpPr>
+        <p:cNvPr id="1" name=""/>
+        <p:cNvGrpSpPr/>
+        <p:nvPr/>
+      </p:nvGrpSpPr>
+      <p:grpSpPr>
+        <a:xfrm>
+          <a:off x="0" y="0"/>
+          <a:ext cx="0" cy="0"/>
+          <a:chOff x="0" y="0"/>
+          <a:chExt cx="0" cy="0"/>
+        </a:xfrm>
+      </p:grpSpPr>
+      <p:sp>
+        <p:nvSpPr>
+          <p:cNvPr id="2" name="Title 1">
+            <a:extLst>
+              <a:ext uri="{FF2B5EF4-FFF2-40B4-BE49-F238E27FC236}">
+                <a16:creationId xmlns:a16="http://schemas.microsoft.com/office/drawing/2014/main" id="{5C427E4C-A965-6370-A8B0-F07696A3109C}"/>
+              </a:ext>
+            </a:extLst>
+          </p:cNvPr>
+          <p:cNvSpPr>
+            <a:spLocks noGrp="1"/>
+          </p:cNvSpPr>
+          <p:nvPr>
+            <p:ph type="title"/>
+          </p:nvPr>
+        </p:nvSpPr>
+        <p:spPr/>
+        <p:txBody>
+          <a:bodyPr/>
+          <a:lstStyle/>
+          <a:p>
+            <a:r>
+              <a:rPr lang="en-GB" dirty="0"/>
+              <a:t>Not a clue, no changes to code, format issue</a:t>
+            </a:r>
+          </a:p>
+        </p:txBody>
+      </p:sp>
+      <p:pic>
+        <p:nvPicPr>
+          <p:cNvPr id="5" name="Content Placeholder 4" descr="A screenshot of a menu&#10;&#10;AI-generated content may be incorrect.">
+            <a:extLst>
+              <a:ext uri="{FF2B5EF4-FFF2-40B4-BE49-F238E27FC236}">
+                <a16:creationId xmlns:a16="http://schemas.microsoft.com/office/drawing/2014/main" id="{78A4724E-822F-F4A0-6955-10385E6B8810}"/>
+              </a:ext>
+            </a:extLst>
+          </p:cNvPr>
+          <p:cNvPicPr>
+            <a:picLocks noGrp="1" noChangeAspect="1"/>
+          </p:cNvPicPr>
+          <p:nvPr>
+            <p:ph idx="1"/>
+          </p:nvPr>
+        </p:nvPicPr>
+        <p:blipFill>
+          <a:blip r:embed="rId2">
+            <a:extLst>
+              <a:ext uri="{28A0092B-C50C-407E-A947-70E740481C1C}">
+                <a14:useLocalDpi xmlns:a14="http://schemas.microsoft.com/office/drawing/2010/main" val="0"/>
+              </a:ext>
+            </a:extLst>
+          </a:blip>
+          <a:stretch>
+            <a:fillRect/>
+          </a:stretch>
+        </p:blipFill>
+        <p:spPr>
+          <a:xfrm>
+            <a:off x="823686" y="1665288"/>
+            <a:ext cx="3066143" cy="3768367"/>
+          </a:xfrm>
+        </p:spPr>
+      </p:pic>
+      <p:pic>
+        <p:nvPicPr>
+          <p:cNvPr id="7" name="Picture 6" descr="A screen shot of a computer code&#10;&#10;AI-generated content may be incorrect.">
+            <a:extLst>
+              <a:ext uri="{FF2B5EF4-FFF2-40B4-BE49-F238E27FC236}">
+                <a16:creationId xmlns:a16="http://schemas.microsoft.com/office/drawing/2014/main" id="{40A80A38-FE91-E3A8-8972-7C2F3F6038FA}"/>
+              </a:ext>
+            </a:extLst>
+          </p:cNvPr>
+          <p:cNvPicPr>
+            <a:picLocks noChangeAspect="1"/>
+          </p:cNvPicPr>
+          <p:nvPr/>
+        </p:nvPicPr>
+        <p:blipFill>
+          <a:blip r:embed="rId3">
+            <a:extLst>
+              <a:ext uri="{28A0092B-C50C-407E-A947-70E740481C1C}">
+                <a14:useLocalDpi xmlns:a14="http://schemas.microsoft.com/office/drawing/2010/main" val="0"/>
+              </a:ext>
+            </a:extLst>
+          </a:blip>
+          <a:stretch>
+            <a:fillRect/>
+          </a:stretch>
+        </p:blipFill>
+        <p:spPr>
+          <a:xfrm>
+            <a:off x="5327709" y="1509103"/>
+            <a:ext cx="5658640" cy="4229690"/>
+          </a:xfrm>
+          <a:prstGeom prst="rect">
+            <a:avLst/>
+          </a:prstGeom>
+        </p:spPr>
+      </p:pic>
+      <p:pic>
+        <p:nvPicPr>
+          <p:cNvPr id="9" name="Picture 8">
+            <a:extLst>
+              <a:ext uri="{FF2B5EF4-FFF2-40B4-BE49-F238E27FC236}">
+                <a16:creationId xmlns:a16="http://schemas.microsoft.com/office/drawing/2014/main" id="{F75110F8-970F-F9A8-C702-78626ED1A42B}"/>
+              </a:ext>
+            </a:extLst>
+          </p:cNvPr>
+          <p:cNvPicPr>
+            <a:picLocks noChangeAspect="1"/>
+          </p:cNvPicPr>
+          <p:nvPr/>
+        </p:nvPicPr>
+        <p:blipFill>
+          <a:blip r:embed="rId4">
+            <a:extLst>
+              <a:ext uri="{28A0092B-C50C-407E-A947-70E740481C1C}">
+                <a14:useLocalDpi xmlns:a14="http://schemas.microsoft.com/office/drawing/2010/main" val="0"/>
+              </a:ext>
+            </a:extLst>
+          </a:blip>
+          <a:stretch>
+            <a:fillRect/>
+          </a:stretch>
+        </p:blipFill>
+        <p:spPr>
+          <a:xfrm>
+            <a:off x="998752" y="6043931"/>
+            <a:ext cx="5271419" cy="233544"/>
+          </a:xfrm>
+          <a:prstGeom prst="rect">
+            <a:avLst/>
+          </a:prstGeom>
+        </p:spPr>
+      </p:pic>
+      <p:pic>
+        <p:nvPicPr>
+          <p:cNvPr id="11" name="Picture 10" descr="A white background with red and green text&#10;&#10;AI-generated content may be incorrect.">
+            <a:extLst>
+              <a:ext uri="{FF2B5EF4-FFF2-40B4-BE49-F238E27FC236}">
+                <a16:creationId xmlns:a16="http://schemas.microsoft.com/office/drawing/2014/main" id="{1F0BA468-45B5-680B-174D-8E749F3E8E75}"/>
+              </a:ext>
+            </a:extLst>
+          </p:cNvPr>
+          <p:cNvPicPr>
+            <a:picLocks noChangeAspect="1"/>
+          </p:cNvPicPr>
+          <p:nvPr/>
+        </p:nvPicPr>
+        <p:blipFill>
+          <a:blip r:embed="rId5">
+            <a:extLst>
+              <a:ext uri="{28A0092B-C50C-407E-A947-70E740481C1C}">
+                <a14:useLocalDpi xmlns:a14="http://schemas.microsoft.com/office/drawing/2010/main" val="0"/>
+              </a:ext>
+            </a:extLst>
+          </a:blip>
+          <a:stretch>
+            <a:fillRect/>
+          </a:stretch>
+        </p:blipFill>
+        <p:spPr>
+          <a:xfrm>
+            <a:off x="6096000" y="5790319"/>
+            <a:ext cx="5668166" cy="771633"/>
+          </a:xfrm>
+          <a:prstGeom prst="rect">
+            <a:avLst/>
+          </a:prstGeom>
+        </p:spPr>
+      </p:pic>
+    </p:spTree>
+    <p:extLst>
+      <p:ext uri="{BB962C8B-B14F-4D97-AF65-F5344CB8AC3E}">
+        <p14:creationId xmlns:p14="http://schemas.microsoft.com/office/powerpoint/2010/main" val="3981447778"/>
+      </p:ext>
+    </p:extLst>
+  </p:cSld>
+  <p:clrMapOvr>
+    <a:masterClrMapping/>
+  </p:clrMapOvr>
+</p:sld>
+</file>
+
+<file path=ppt/slides/slide13.xml><?xml version="1.0" encoding="utf-8"?>
+<p:sld xmlns:a="http://schemas.openxmlformats.org/drawingml/2006/main" xmlns:r="http://schemas.openxmlformats.org/officeDocument/2006/relationships" xmlns:p="http://schemas.openxmlformats.org/presentationml/2006/main">
+  <p:cSld>
+    <p:spTree>
+      <p:nvGrpSpPr>
+        <p:cNvPr id="1" name=""/>
+        <p:cNvGrpSpPr/>
+        <p:nvPr/>
+      </p:nvGrpSpPr>
+      <p:grpSpPr>
+        <a:xfrm>
+          <a:off x="0" y="0"/>
+          <a:ext cx="0" cy="0"/>
+          <a:chOff x="0" y="0"/>
+          <a:chExt cx="0" cy="0"/>
+        </a:xfrm>
+      </p:grpSpPr>
+      <p:sp>
+        <p:nvSpPr>
+          <p:cNvPr id="2" name="Title 1">
+            <a:extLst>
+              <a:ext uri="{FF2B5EF4-FFF2-40B4-BE49-F238E27FC236}">
+                <a16:creationId xmlns:a16="http://schemas.microsoft.com/office/drawing/2014/main" id="{E464CE87-2CE8-14F5-88EB-B3724908315C}"/>
+              </a:ext>
+            </a:extLst>
+          </p:cNvPr>
+          <p:cNvSpPr>
+            <a:spLocks noGrp="1"/>
+          </p:cNvSpPr>
+          <p:nvPr>
+            <p:ph type="title"/>
+          </p:nvPr>
+        </p:nvSpPr>
+        <p:spPr/>
+        <p:txBody>
+          <a:bodyPr/>
+          <a:lstStyle/>
+          <a:p>
+            <a:r>
+              <a:rPr lang="en-GB" dirty="0"/>
+              <a:t>Resolution to format problem, change from f strings to round</a:t>
+            </a:r>
+          </a:p>
+        </p:txBody>
+      </p:sp>
+      <p:pic>
+        <p:nvPicPr>
+          <p:cNvPr id="4" name="Picture 3">
+            <a:extLst>
+              <a:ext uri="{FF2B5EF4-FFF2-40B4-BE49-F238E27FC236}">
+                <a16:creationId xmlns:a16="http://schemas.microsoft.com/office/drawing/2014/main" id="{620C896E-2413-F6A2-9F44-4A7F90F90136}"/>
+              </a:ext>
+            </a:extLst>
+          </p:cNvPr>
+          <p:cNvPicPr>
+            <a:picLocks noChangeAspect="1"/>
+          </p:cNvPicPr>
+          <p:nvPr/>
+        </p:nvPicPr>
+        <p:blipFill>
+          <a:blip r:embed="rId2"/>
+          <a:stretch>
+            <a:fillRect/>
+          </a:stretch>
+        </p:blipFill>
+        <p:spPr>
+          <a:xfrm>
+            <a:off x="279142" y="2378882"/>
+            <a:ext cx="5944115" cy="213378"/>
+          </a:xfrm>
+          <a:prstGeom prst="rect">
+            <a:avLst/>
+          </a:prstGeom>
+        </p:spPr>
+      </p:pic>
+      <p:pic>
+        <p:nvPicPr>
+          <p:cNvPr id="8" name="Picture 7" descr="A screenshot of a computer code&#10;&#10;AI-generated content may be incorrect.">
+            <a:extLst>
+              <a:ext uri="{FF2B5EF4-FFF2-40B4-BE49-F238E27FC236}">
+                <a16:creationId xmlns:a16="http://schemas.microsoft.com/office/drawing/2014/main" id="{2F0DF58B-1D8D-2918-371F-47427ADBBC35}"/>
+              </a:ext>
+            </a:extLst>
+          </p:cNvPr>
+          <p:cNvPicPr>
+            <a:picLocks noChangeAspect="1"/>
+          </p:cNvPicPr>
+          <p:nvPr/>
+        </p:nvPicPr>
+        <p:blipFill>
+          <a:blip r:embed="rId3">
+            <a:extLst>
+              <a:ext uri="{28A0092B-C50C-407E-A947-70E740481C1C}">
+                <a14:useLocalDpi xmlns:a14="http://schemas.microsoft.com/office/drawing/2010/main" val="0"/>
+              </a:ext>
+            </a:extLst>
+          </a:blip>
+          <a:stretch>
+            <a:fillRect/>
+          </a:stretch>
+        </p:blipFill>
+        <p:spPr>
+          <a:xfrm>
+            <a:off x="6096000" y="1893870"/>
+            <a:ext cx="5620534" cy="3505689"/>
+          </a:xfrm>
+          <a:prstGeom prst="rect">
+            <a:avLst/>
+          </a:prstGeom>
+        </p:spPr>
+      </p:pic>
+      <p:pic>
+        <p:nvPicPr>
+          <p:cNvPr id="6" name="Content Placeholder 5">
+            <a:extLst>
+              <a:ext uri="{FF2B5EF4-FFF2-40B4-BE49-F238E27FC236}">
+                <a16:creationId xmlns:a16="http://schemas.microsoft.com/office/drawing/2014/main" id="{10618259-4285-5DA4-0F81-B6D128EDF6BE}"/>
+              </a:ext>
+            </a:extLst>
+          </p:cNvPr>
+          <p:cNvPicPr>
+            <a:picLocks noGrp="1" noChangeAspect="1"/>
+          </p:cNvPicPr>
+          <p:nvPr>
+            <p:ph idx="1"/>
+          </p:nvPr>
+        </p:nvPicPr>
+        <p:blipFill>
+          <a:blip r:embed="rId4">
+            <a:extLst>
+              <a:ext uri="{28A0092B-C50C-407E-A947-70E740481C1C}">
+                <a14:useLocalDpi xmlns:a14="http://schemas.microsoft.com/office/drawing/2010/main" val="0"/>
+              </a:ext>
+            </a:extLst>
+          </a:blip>
+          <a:stretch>
+            <a:fillRect/>
+          </a:stretch>
+        </p:blipFill>
+        <p:spPr>
+          <a:xfrm>
+            <a:off x="0" y="2722810"/>
+            <a:ext cx="6487430" cy="371527"/>
+          </a:xfrm>
+        </p:spPr>
+      </p:pic>
+    </p:spTree>
+    <p:extLst>
+      <p:ext uri="{BB962C8B-B14F-4D97-AF65-F5344CB8AC3E}">
+        <p14:creationId xmlns:p14="http://schemas.microsoft.com/office/powerpoint/2010/main" val="348271633"/>
+      </p:ext>
+    </p:extLst>
+  </p:cSld>
+  <p:clrMapOvr>
+    <a:masterClrMapping/>
+  </p:clrMapOvr>
+</p:sld>
+</file>
+
+<file path=ppt/slides/slide14.xml><?xml version="1.0" encoding="utf-8"?>
+<p:sld xmlns:a="http://schemas.openxmlformats.org/drawingml/2006/main" xmlns:r="http://schemas.openxmlformats.org/officeDocument/2006/relationships" xmlns:p="http://schemas.openxmlformats.org/presentationml/2006/main">
+  <p:cSld>
+    <p:spTree>
+      <p:nvGrpSpPr>
+        <p:cNvPr id="1" name=""/>
+        <p:cNvGrpSpPr/>
+        <p:nvPr/>
+      </p:nvGrpSpPr>
+      <p:grpSpPr>
+        <a:xfrm>
+          <a:off x="0" y="0"/>
+          <a:ext cx="0" cy="0"/>
+          <a:chOff x="0" y="0"/>
+          <a:chExt cx="0" cy="0"/>
+        </a:xfrm>
+      </p:grpSpPr>
+      <p:sp>
+        <p:nvSpPr>
+          <p:cNvPr id="2" name="Title 1">
+            <a:extLst>
+              <a:ext uri="{FF2B5EF4-FFF2-40B4-BE49-F238E27FC236}">
+                <a16:creationId xmlns:a16="http://schemas.microsoft.com/office/drawing/2014/main" id="{140E01A9-9747-72CF-54E4-4A400D6A464B}"/>
+              </a:ext>
+            </a:extLst>
+          </p:cNvPr>
+          <p:cNvSpPr>
+            <a:spLocks noGrp="1"/>
+          </p:cNvSpPr>
+          <p:nvPr>
+            <p:ph type="title"/>
+          </p:nvPr>
+        </p:nvSpPr>
+        <p:spPr/>
+        <p:txBody>
+          <a:bodyPr/>
+          <a:lstStyle/>
+          <a:p>
+            <a:r>
+              <a:rPr lang="en-GB" dirty="0"/>
+              <a:t>Capitalisation didn’t allow, need a lower block</a:t>
+            </a:r>
+          </a:p>
+        </p:txBody>
+      </p:sp>
+      <p:pic>
+        <p:nvPicPr>
+          <p:cNvPr id="5" name="Content Placeholder 4" descr="A screenshot of a computer&#10;&#10;AI-generated content may be incorrect.">
+            <a:extLst>
+              <a:ext uri="{FF2B5EF4-FFF2-40B4-BE49-F238E27FC236}">
+                <a16:creationId xmlns:a16="http://schemas.microsoft.com/office/drawing/2014/main" id="{2BA90DFD-3353-4FF3-C92E-EBD4AC008454}"/>
+              </a:ext>
+            </a:extLst>
+          </p:cNvPr>
+          <p:cNvPicPr>
+            <a:picLocks noGrp="1" noChangeAspect="1"/>
+          </p:cNvPicPr>
+          <p:nvPr>
+            <p:ph idx="1"/>
+          </p:nvPr>
+        </p:nvPicPr>
+        <p:blipFill>
+          <a:blip r:embed="rId2">
+            <a:extLst>
+              <a:ext uri="{28A0092B-C50C-407E-A947-70E740481C1C}">
+                <a14:useLocalDpi xmlns:a14="http://schemas.microsoft.com/office/drawing/2010/main" val="0"/>
+              </a:ext>
+            </a:extLst>
+          </a:blip>
+          <a:stretch>
+            <a:fillRect/>
+          </a:stretch>
+        </p:blipFill>
+        <p:spPr>
+          <a:xfrm>
+            <a:off x="573306" y="1690689"/>
+            <a:ext cx="3577780" cy="3567702"/>
+          </a:xfrm>
+        </p:spPr>
+      </p:pic>
+      <p:pic>
+        <p:nvPicPr>
+          <p:cNvPr id="7" name="Picture 6" descr="A white screen with text&#10;&#10;AI-generated content may be incorrect.">
+            <a:extLst>
+              <a:ext uri="{FF2B5EF4-FFF2-40B4-BE49-F238E27FC236}">
+                <a16:creationId xmlns:a16="http://schemas.microsoft.com/office/drawing/2014/main" id="{9C32FB63-D435-9B00-5088-6E6613640066}"/>
+              </a:ext>
+            </a:extLst>
+          </p:cNvPr>
+          <p:cNvPicPr>
+            <a:picLocks noChangeAspect="1"/>
+          </p:cNvPicPr>
+          <p:nvPr/>
+        </p:nvPicPr>
+        <p:blipFill>
+          <a:blip r:embed="rId3">
+            <a:extLst>
+              <a:ext uri="{28A0092B-C50C-407E-A947-70E740481C1C}">
+                <a14:useLocalDpi xmlns:a14="http://schemas.microsoft.com/office/drawing/2010/main" val="0"/>
+              </a:ext>
+            </a:extLst>
+          </a:blip>
+          <a:stretch>
+            <a:fillRect/>
+          </a:stretch>
+        </p:blipFill>
+        <p:spPr>
+          <a:xfrm>
+            <a:off x="4553281" y="1633530"/>
+            <a:ext cx="5001323" cy="1743318"/>
+          </a:xfrm>
+          <a:prstGeom prst="rect">
+            <a:avLst/>
+          </a:prstGeom>
+        </p:spPr>
+      </p:pic>
+      <p:pic>
+        <p:nvPicPr>
+          <p:cNvPr id="11" name="Picture 10">
+            <a:extLst>
+              <a:ext uri="{FF2B5EF4-FFF2-40B4-BE49-F238E27FC236}">
+                <a16:creationId xmlns:a16="http://schemas.microsoft.com/office/drawing/2014/main" id="{81771535-324D-F216-EB91-C507D7D66AC6}"/>
+              </a:ext>
+            </a:extLst>
+          </p:cNvPr>
+          <p:cNvPicPr>
+            <a:picLocks noChangeAspect="1"/>
+          </p:cNvPicPr>
+          <p:nvPr/>
+        </p:nvPicPr>
+        <p:blipFill>
+          <a:blip r:embed="rId4">
+            <a:extLst>
+              <a:ext uri="{28A0092B-C50C-407E-A947-70E740481C1C}">
+                <a14:useLocalDpi xmlns:a14="http://schemas.microsoft.com/office/drawing/2010/main" val="0"/>
+              </a:ext>
+            </a:extLst>
+          </a:blip>
+          <a:stretch>
+            <a:fillRect/>
+          </a:stretch>
+        </p:blipFill>
+        <p:spPr>
+          <a:xfrm>
+            <a:off x="838200" y="5705228"/>
+            <a:ext cx="3972479" cy="295316"/>
+          </a:xfrm>
+          <a:prstGeom prst="rect">
+            <a:avLst/>
+          </a:prstGeom>
+        </p:spPr>
+      </p:pic>
+      <p:pic>
+        <p:nvPicPr>
+          <p:cNvPr id="13" name="Picture 12" descr="A screenshot of a computer program&#10;&#10;AI-generated content may be incorrect.">
+            <a:extLst>
+              <a:ext uri="{FF2B5EF4-FFF2-40B4-BE49-F238E27FC236}">
+                <a16:creationId xmlns:a16="http://schemas.microsoft.com/office/drawing/2014/main" id="{C47AD36B-C5B6-4D2D-1CE4-6037A7A118B3}"/>
+              </a:ext>
+            </a:extLst>
+          </p:cNvPr>
+          <p:cNvPicPr>
+            <a:picLocks noChangeAspect="1"/>
+          </p:cNvPicPr>
+          <p:nvPr/>
+        </p:nvPicPr>
+        <p:blipFill>
+          <a:blip r:embed="rId5">
+            <a:extLst>
+              <a:ext uri="{28A0092B-C50C-407E-A947-70E740481C1C}">
+                <a14:useLocalDpi xmlns:a14="http://schemas.microsoft.com/office/drawing/2010/main" val="0"/>
+              </a:ext>
+            </a:extLst>
+          </a:blip>
+          <a:stretch>
+            <a:fillRect/>
+          </a:stretch>
+        </p:blipFill>
+        <p:spPr>
+          <a:xfrm>
+            <a:off x="4839071" y="3579791"/>
+            <a:ext cx="4715533" cy="1733792"/>
+          </a:xfrm>
+          <a:prstGeom prst="rect">
+            <a:avLst/>
+          </a:prstGeom>
+        </p:spPr>
+      </p:pic>
+    </p:spTree>
+    <p:extLst>
+      <p:ext uri="{BB962C8B-B14F-4D97-AF65-F5344CB8AC3E}">
+        <p14:creationId xmlns:p14="http://schemas.microsoft.com/office/powerpoint/2010/main" val="3482844506"/>
+      </p:ext>
+    </p:extLst>
+  </p:cSld>
+  <p:clrMapOvr>
+    <a:masterClrMapping/>
+  </p:clrMapOvr>
+</p:sld>
+</file>
+
+<file path=ppt/slides/slide15.xml><?xml version="1.0" encoding="utf-8"?>
+<p:sld xmlns:a="http://schemas.openxmlformats.org/drawingml/2006/main" xmlns:r="http://schemas.openxmlformats.org/officeDocument/2006/relationships" xmlns:p="http://schemas.openxmlformats.org/presentationml/2006/main">
+  <p:cSld>
+    <p:spTree>
+      <p:nvGrpSpPr>
+        <p:cNvPr id="1" name=""/>
+        <p:cNvGrpSpPr/>
+        <p:nvPr/>
+      </p:nvGrpSpPr>
+      <p:grpSpPr>
+        <a:xfrm>
+          <a:off x="0" y="0"/>
+          <a:ext cx="0" cy="0"/>
+          <a:chOff x="0" y="0"/>
+          <a:chExt cx="0" cy="0"/>
+        </a:xfrm>
+      </p:grpSpPr>
+      <p:sp>
+        <p:nvSpPr>
+          <p:cNvPr id="2" name="Title 1">
+            <a:extLst>
+              <a:ext uri="{FF2B5EF4-FFF2-40B4-BE49-F238E27FC236}">
+                <a16:creationId xmlns:a16="http://schemas.microsoft.com/office/drawing/2014/main" id="{E65C128A-BADB-A102-6C05-8AE0A813C82B}"/>
+              </a:ext>
+            </a:extLst>
+          </p:cNvPr>
+          <p:cNvSpPr>
+            <a:spLocks noGrp="1"/>
+          </p:cNvSpPr>
+          <p:nvPr>
+            <p:ph type="title"/>
+          </p:nvPr>
+        </p:nvSpPr>
+        <p:spPr/>
+        <p:txBody>
+          <a:bodyPr/>
+          <a:lstStyle/>
+          <a:p>
+            <a:r>
+              <a:rPr lang="en-GB" dirty="0"/>
+              <a:t>Continuation of page 14</a:t>
+            </a:r>
+          </a:p>
+        </p:txBody>
+      </p:sp>
+      <p:pic>
+        <p:nvPicPr>
+          <p:cNvPr id="5" name="Content Placeholder 4" descr="A white background with blue text&#10;&#10;AI-generated content may be incorrect.">
+            <a:extLst>
+              <a:ext uri="{FF2B5EF4-FFF2-40B4-BE49-F238E27FC236}">
+                <a16:creationId xmlns:a16="http://schemas.microsoft.com/office/drawing/2014/main" id="{B3827F06-8E40-E906-837B-7FCC8916524F}"/>
+              </a:ext>
+            </a:extLst>
+          </p:cNvPr>
+          <p:cNvPicPr>
+            <a:picLocks noGrp="1" noChangeAspect="1"/>
+          </p:cNvPicPr>
+          <p:nvPr>
+            <p:ph idx="1"/>
+          </p:nvPr>
+        </p:nvPicPr>
+        <p:blipFill>
+          <a:blip r:embed="rId2">
+            <a:extLst>
+              <a:ext uri="{28A0092B-C50C-407E-A947-70E740481C1C}">
+                <a14:useLocalDpi xmlns:a14="http://schemas.microsoft.com/office/drawing/2010/main" val="0"/>
+              </a:ext>
+            </a:extLst>
+          </a:blip>
+          <a:stretch>
+            <a:fillRect/>
+          </a:stretch>
+        </p:blipFill>
+        <p:spPr>
+          <a:xfrm>
+            <a:off x="1049129" y="1914116"/>
+            <a:ext cx="2981741" cy="981212"/>
+          </a:xfrm>
+        </p:spPr>
+      </p:pic>
+      <p:pic>
+        <p:nvPicPr>
+          <p:cNvPr id="7" name="Picture 6" descr="A computer code with colorful text&#10;&#10;AI-generated content may be incorrect.">
+            <a:extLst>
+              <a:ext uri="{FF2B5EF4-FFF2-40B4-BE49-F238E27FC236}">
+                <a16:creationId xmlns:a16="http://schemas.microsoft.com/office/drawing/2014/main" id="{18C5B452-17C2-A4E3-0897-EF3951CB52A6}"/>
+              </a:ext>
+            </a:extLst>
+          </p:cNvPr>
+          <p:cNvPicPr>
+            <a:picLocks noChangeAspect="1"/>
+          </p:cNvPicPr>
+          <p:nvPr/>
+        </p:nvPicPr>
+        <p:blipFill>
+          <a:blip r:embed="rId3">
+            <a:extLst>
+              <a:ext uri="{28A0092B-C50C-407E-A947-70E740481C1C}">
+                <a14:useLocalDpi xmlns:a14="http://schemas.microsoft.com/office/drawing/2010/main" val="0"/>
+              </a:ext>
+            </a:extLst>
+          </a:blip>
+          <a:stretch>
+            <a:fillRect/>
+          </a:stretch>
+        </p:blipFill>
+        <p:spPr>
+          <a:xfrm>
+            <a:off x="4830401" y="1999853"/>
+            <a:ext cx="5172797" cy="809738"/>
+          </a:xfrm>
+          <a:prstGeom prst="rect">
+            <a:avLst/>
+          </a:prstGeom>
+        </p:spPr>
+      </p:pic>
+    </p:spTree>
+    <p:extLst>
+      <p:ext uri="{BB962C8B-B14F-4D97-AF65-F5344CB8AC3E}">
+        <p14:creationId xmlns:p14="http://schemas.microsoft.com/office/powerpoint/2010/main" val="2869504880"/>
+      </p:ext>
+    </p:extLst>
+  </p:cSld>
+  <p:clrMapOvr>
+    <a:masterClrMapping/>
+  </p:clrMapOvr>
+</p:sld>
+</file>
+
+<file path=ppt/slides/slide16.xml><?xml version="1.0" encoding="utf-8"?>
+<p:sld xmlns:a="http://schemas.openxmlformats.org/drawingml/2006/main" xmlns:r="http://schemas.openxmlformats.org/officeDocument/2006/relationships" xmlns:p="http://schemas.openxmlformats.org/presentationml/2006/main">
+  <p:cSld>
+    <p:spTree>
+      <p:nvGrpSpPr>
+        <p:cNvPr id="1" name=""/>
+        <p:cNvGrpSpPr/>
+        <p:nvPr/>
+      </p:nvGrpSpPr>
+      <p:grpSpPr>
+        <a:xfrm>
+          <a:off x="0" y="0"/>
+          <a:ext cx="0" cy="0"/>
+          <a:chOff x="0" y="0"/>
+          <a:chExt cx="0" cy="0"/>
+        </a:xfrm>
+      </p:grpSpPr>
+      <p:sp>
+        <p:nvSpPr>
+          <p:cNvPr id="2" name="Title 1">
+            <a:extLst>
+              <a:ext uri="{FF2B5EF4-FFF2-40B4-BE49-F238E27FC236}">
+                <a16:creationId xmlns:a16="http://schemas.microsoft.com/office/drawing/2014/main" id="{3E9B125B-206A-78DC-14CE-FAC6EC0DBE27}"/>
+              </a:ext>
+            </a:extLst>
+          </p:cNvPr>
+          <p:cNvSpPr>
+            <a:spLocks noGrp="1"/>
+          </p:cNvSpPr>
+          <p:nvPr>
+            <p:ph type="title"/>
+          </p:nvPr>
+        </p:nvSpPr>
+        <p:spPr/>
+        <p:txBody>
+          <a:bodyPr/>
+          <a:lstStyle/>
+          <a:p>
+            <a:r>
+              <a:rPr lang="en-GB" dirty="0"/>
+              <a:t>Continues even if you haven’t ordered anything with f</a:t>
+            </a:r>
+          </a:p>
+        </p:txBody>
+      </p:sp>
+      <p:sp>
+        <p:nvSpPr>
+          <p:cNvPr id="3" name="Content Placeholder 2">
+            <a:extLst>
+              <a:ext uri="{FF2B5EF4-FFF2-40B4-BE49-F238E27FC236}">
+                <a16:creationId xmlns:a16="http://schemas.microsoft.com/office/drawing/2014/main" id="{807A4772-CF45-4AC7-6FF2-4D18FA764EBF}"/>
+              </a:ext>
+            </a:extLst>
+          </p:cNvPr>
+          <p:cNvSpPr>
+            <a:spLocks noGrp="1"/>
+          </p:cNvSpPr>
+          <p:nvPr>
+            <p:ph idx="1"/>
+          </p:nvPr>
+        </p:nvSpPr>
+        <p:spPr/>
+        <p:txBody>
+          <a:bodyPr/>
+          <a:lstStyle/>
+          <a:p>
+            <a:endParaRPr lang="en-GB"/>
+          </a:p>
+        </p:txBody>
+      </p:sp>
+    </p:spTree>
+    <p:extLst>
+      <p:ext uri="{BB962C8B-B14F-4D97-AF65-F5344CB8AC3E}">
+        <p14:creationId xmlns:p14="http://schemas.microsoft.com/office/powerpoint/2010/main" val="693211685"/>
+      </p:ext>
+    </p:extLst>
+  </p:cSld>
+  <p:clrMapOvr>
+    <a:masterClrMapping/>
+  </p:clrMapOvr>
+</p:sld>
+</file>
+
+<file path=ppt/slides/slide17.xml><?xml version="1.0" encoding="utf-8"?>
+<p:sld xmlns:a="http://schemas.openxmlformats.org/drawingml/2006/main" xmlns:r="http://schemas.openxmlformats.org/officeDocument/2006/relationships" xmlns:p="http://schemas.openxmlformats.org/presentationml/2006/main">
+  <p:cSld>
+    <p:spTree>
+      <p:nvGrpSpPr>
+        <p:cNvPr id="1" name=""/>
+        <p:cNvGrpSpPr/>
+        <p:nvPr/>
+      </p:nvGrpSpPr>
+      <p:grpSpPr>
+        <a:xfrm>
+          <a:off x="0" y="0"/>
+          <a:ext cx="0" cy="0"/>
+          <a:chOff x="0" y="0"/>
+          <a:chExt cx="0" cy="0"/>
+        </a:xfrm>
+      </p:grpSpPr>
+      <p:sp>
+        <p:nvSpPr>
+          <p:cNvPr id="2" name="Title 1">
+            <a:extLst>
+              <a:ext uri="{FF2B5EF4-FFF2-40B4-BE49-F238E27FC236}">
+                <a16:creationId xmlns:a16="http://schemas.microsoft.com/office/drawing/2014/main" id="{37266345-BBE7-B2C2-2E4A-B54011B4A0EF}"/>
+              </a:ext>
+            </a:extLst>
+          </p:cNvPr>
+          <p:cNvSpPr>
+            <a:spLocks noGrp="1"/>
+          </p:cNvSpPr>
+          <p:nvPr>
+            <p:ph type="title"/>
+          </p:nvPr>
+        </p:nvSpPr>
+        <p:spPr/>
+        <p:txBody>
+          <a:bodyPr/>
+          <a:lstStyle/>
+          <a:p>
+            <a:r>
+              <a:rPr lang="en-GB" dirty="0"/>
+              <a:t>Errors if you put a tip that isn’t part of the list</a:t>
+            </a:r>
+          </a:p>
+        </p:txBody>
+      </p:sp>
+      <p:sp>
+        <p:nvSpPr>
+          <p:cNvPr id="3" name="Content Placeholder 2">
+            <a:extLst>
+              <a:ext uri="{FF2B5EF4-FFF2-40B4-BE49-F238E27FC236}">
+                <a16:creationId xmlns:a16="http://schemas.microsoft.com/office/drawing/2014/main" id="{97E50CE4-65BC-CC84-055B-214185378C4A}"/>
+              </a:ext>
+            </a:extLst>
+          </p:cNvPr>
+          <p:cNvSpPr>
+            <a:spLocks noGrp="1"/>
+          </p:cNvSpPr>
+          <p:nvPr>
+            <p:ph idx="1"/>
+          </p:nvPr>
+        </p:nvSpPr>
+        <p:spPr/>
+        <p:txBody>
+          <a:bodyPr/>
+          <a:lstStyle/>
+          <a:p>
+            <a:endParaRPr lang="en-GB"/>
+          </a:p>
+        </p:txBody>
+      </p:sp>
+    </p:spTree>
+    <p:extLst>
+      <p:ext uri="{BB962C8B-B14F-4D97-AF65-F5344CB8AC3E}">
+        <p14:creationId xmlns:p14="http://schemas.microsoft.com/office/powerpoint/2010/main" val="657420005"/>
+      </p:ext>
+    </p:extLst>
+  </p:cSld>
+  <p:clrMapOvr>
+    <a:masterClrMapping/>
+  </p:clrMapOvr>
+</p:sld>
+</file>
+
+<file path=ppt/slides/slide18.xml><?xml version="1.0" encoding="utf-8"?>
+<p:sld xmlns:a="http://schemas.openxmlformats.org/drawingml/2006/main" xmlns:r="http://schemas.openxmlformats.org/officeDocument/2006/relationships" xmlns:p="http://schemas.openxmlformats.org/presentationml/2006/main">
+  <p:cSld>
+    <p:spTree>
+      <p:nvGrpSpPr>
+        <p:cNvPr id="1" name=""/>
+        <p:cNvGrpSpPr/>
+        <p:nvPr/>
+      </p:nvGrpSpPr>
+      <p:grpSpPr>
+        <a:xfrm>
+          <a:off x="0" y="0"/>
+          <a:ext cx="0" cy="0"/>
+          <a:chOff x="0" y="0"/>
+          <a:chExt cx="0" cy="0"/>
+        </a:xfrm>
+      </p:grpSpPr>
+      <p:sp>
+        <p:nvSpPr>
+          <p:cNvPr id="2" name="Title 1">
+            <a:extLst>
+              <a:ext uri="{FF2B5EF4-FFF2-40B4-BE49-F238E27FC236}">
+                <a16:creationId xmlns:a16="http://schemas.microsoft.com/office/drawing/2014/main" id="{DA64C076-DCE3-7941-A173-61A10E7A54DA}"/>
+              </a:ext>
+            </a:extLst>
+          </p:cNvPr>
+          <p:cNvSpPr>
+            <a:spLocks noGrp="1"/>
+          </p:cNvSpPr>
+          <p:nvPr>
+            <p:ph type="title"/>
+          </p:nvPr>
+        </p:nvSpPr>
+        <p:spPr/>
+        <p:txBody>
+          <a:bodyPr/>
+          <a:lstStyle/>
+          <a:p>
+            <a:r>
+              <a:rPr lang="en-GB" dirty="0"/>
+              <a:t>Whatever this is</a:t>
+            </a:r>
+          </a:p>
+        </p:txBody>
+      </p:sp>
+      <p:pic>
+        <p:nvPicPr>
+          <p:cNvPr id="5" name="Content Placeholder 4" descr="A close-up of a message&#10;&#10;AI-generated content may be incorrect.">
+            <a:extLst>
+              <a:ext uri="{FF2B5EF4-FFF2-40B4-BE49-F238E27FC236}">
+                <a16:creationId xmlns:a16="http://schemas.microsoft.com/office/drawing/2014/main" id="{E0DD45C2-9696-7E38-7D7E-3A125E9E6AFE}"/>
+              </a:ext>
+            </a:extLst>
+          </p:cNvPr>
+          <p:cNvPicPr>
+            <a:picLocks noGrp="1" noChangeAspect="1"/>
+          </p:cNvPicPr>
+          <p:nvPr>
+            <p:ph idx="1"/>
+          </p:nvPr>
+        </p:nvPicPr>
+        <p:blipFill>
+          <a:blip r:embed="rId2">
+            <a:extLst>
+              <a:ext uri="{28A0092B-C50C-407E-A947-70E740481C1C}">
+                <a14:useLocalDpi xmlns:a14="http://schemas.microsoft.com/office/drawing/2010/main" val="0"/>
+              </a:ext>
+            </a:extLst>
+          </a:blip>
+          <a:stretch>
+            <a:fillRect/>
+          </a:stretch>
+        </p:blipFill>
+        <p:spPr>
+          <a:xfrm>
+            <a:off x="552453" y="1771461"/>
+            <a:ext cx="11087093" cy="1985749"/>
+          </a:xfrm>
+        </p:spPr>
+      </p:pic>
+    </p:spTree>
+    <p:extLst>
+      <p:ext uri="{BB962C8B-B14F-4D97-AF65-F5344CB8AC3E}">
+        <p14:creationId xmlns:p14="http://schemas.microsoft.com/office/powerpoint/2010/main" val="1285068734"/>
+      </p:ext>
+    </p:extLst>
+  </p:cSld>
+  <p:clrMapOvr>
+    <a:masterClrMapping/>
+  </p:clrMapOvr>
+</p:sld>
+</file>
+
 <file path=ppt/slides/slide2.xml><?xml version="1.0" encoding="utf-8"?>
 <p:sld xmlns:a="http://schemas.openxmlformats.org/drawingml/2006/main" xmlns:r="http://schemas.openxmlformats.org/officeDocument/2006/relationships" xmlns:p="http://schemas.openxmlformats.org/presentationml/2006/main">
   <p:cSld>
@@ -3441,7 +5444,18 @@
           <a:bodyPr/>
           <a:lstStyle/>
           <a:p>
-            <a:endParaRPr lang="en-GB"/>
+            <a:r>
+              <a:rPr lang="en-GB" dirty="0"/>
+              <a:t>1</a:t>
+            </a:r>
+            <a:r>
+              <a:rPr lang="en-GB" baseline="30000" dirty="0"/>
+              <a:t>st</a:t>
+            </a:r>
+            <a:r>
+              <a:rPr lang="en-GB" dirty="0"/>
+              <a:t> forming the menu and order functions</a:t>
+            </a:r>
           </a:p>
         </p:txBody>
       </p:sp>
@@ -3482,10 +5496,10 @@
       </p:pic>
       <p:pic>
         <p:nvPicPr>
-          <p:cNvPr id="7" name="Picture 6" descr="A screenshot of a computer&#10;&#10;AI-generated content may be incorrect.">
-            <a:extLst>
-              <a:ext uri="{FF2B5EF4-FFF2-40B4-BE49-F238E27FC236}">
-                <a16:creationId xmlns:a16="http://schemas.microsoft.com/office/drawing/2014/main" id="{B997B37A-B4E8-A2AC-CCBC-8B73BF16E577}"/>
+          <p:cNvPr id="4" name="Picture 3" descr="A screenshot of a computer&#10;&#10;AI-generated content may be incorrect.">
+            <a:extLst>
+              <a:ext uri="{FF2B5EF4-FFF2-40B4-BE49-F238E27FC236}">
+                <a16:creationId xmlns:a16="http://schemas.microsoft.com/office/drawing/2014/main" id="{429E9EBF-69E5-8217-E080-8BDAF0B9CD2C}"/>
               </a:ext>
             </a:extLst>
           </p:cNvPr>
@@ -3508,8 +5522,44 @@
         </p:blipFill>
         <p:spPr>
           <a:xfrm>
-            <a:off x="5870017" y="1900345"/>
-            <a:ext cx="4010585" cy="1857634"/>
+            <a:off x="5982558" y="4415194"/>
+            <a:ext cx="4105848" cy="1686160"/>
+          </a:xfrm>
+          <a:prstGeom prst="rect">
+            <a:avLst/>
+          </a:prstGeom>
+        </p:spPr>
+      </p:pic>
+      <p:pic>
+        <p:nvPicPr>
+          <p:cNvPr id="8" name="Picture 7" descr="A screenshot of a computer&#10;&#10;AI-generated content may be incorrect.">
+            <a:extLst>
+              <a:ext uri="{FF2B5EF4-FFF2-40B4-BE49-F238E27FC236}">
+                <a16:creationId xmlns:a16="http://schemas.microsoft.com/office/drawing/2014/main" id="{F8947451-E1FE-2221-3106-952796E6319D}"/>
+              </a:ext>
+            </a:extLst>
+          </p:cNvPr>
+          <p:cNvPicPr>
+            <a:picLocks noChangeAspect="1"/>
+          </p:cNvPicPr>
+          <p:nvPr/>
+        </p:nvPicPr>
+        <p:blipFill>
+          <a:blip r:embed="rId4">
+            <a:extLst>
+              <a:ext uri="{28A0092B-C50C-407E-A947-70E740481C1C}">
+                <a14:useLocalDpi xmlns:a14="http://schemas.microsoft.com/office/drawing/2010/main" val="0"/>
+              </a:ext>
+            </a:extLst>
+          </a:blip>
+          <a:stretch>
+            <a:fillRect/>
+          </a:stretch>
+        </p:blipFill>
+        <p:spPr>
+          <a:xfrm>
+            <a:off x="5841882" y="2110604"/>
+            <a:ext cx="4010585" cy="1952898"/>
           </a:xfrm>
           <a:prstGeom prst="rect">
             <a:avLst/>
@@ -3520,6 +5570,1071 @@
     <p:extLst>
       <p:ext uri="{BB962C8B-B14F-4D97-AF65-F5344CB8AC3E}">
         <p14:creationId xmlns:p14="http://schemas.microsoft.com/office/powerpoint/2010/main" val="161817149"/>
+      </p:ext>
+    </p:extLst>
+  </p:cSld>
+  <p:clrMapOvr>
+    <a:masterClrMapping/>
+  </p:clrMapOvr>
+</p:sld>
+</file>
+
+<file path=ppt/slides/slide3.xml><?xml version="1.0" encoding="utf-8"?>
+<p:sld xmlns:a="http://schemas.openxmlformats.org/drawingml/2006/main" xmlns:r="http://schemas.openxmlformats.org/officeDocument/2006/relationships" xmlns:p="http://schemas.openxmlformats.org/presentationml/2006/main">
+  <p:cSld>
+    <p:spTree>
+      <p:nvGrpSpPr>
+        <p:cNvPr id="1" name=""/>
+        <p:cNvGrpSpPr/>
+        <p:nvPr/>
+      </p:nvGrpSpPr>
+      <p:grpSpPr>
+        <a:xfrm>
+          <a:off x="0" y="0"/>
+          <a:ext cx="0" cy="0"/>
+          <a:chOff x="0" y="0"/>
+          <a:chExt cx="0" cy="0"/>
+        </a:xfrm>
+      </p:grpSpPr>
+      <p:sp>
+        <p:nvSpPr>
+          <p:cNvPr id="2" name="Title 1">
+            <a:extLst>
+              <a:ext uri="{FF2B5EF4-FFF2-40B4-BE49-F238E27FC236}">
+                <a16:creationId xmlns:a16="http://schemas.microsoft.com/office/drawing/2014/main" id="{8F7ED36C-7668-3D63-2ADA-181C1C3342E4}"/>
+              </a:ext>
+            </a:extLst>
+          </p:cNvPr>
+          <p:cNvSpPr>
+            <a:spLocks noGrp="1"/>
+          </p:cNvSpPr>
+          <p:nvPr>
+            <p:ph type="title"/>
+          </p:nvPr>
+        </p:nvSpPr>
+        <p:spPr>
+          <a:xfrm>
+            <a:off x="838200" y="182245"/>
+            <a:ext cx="10515600" cy="1325563"/>
+          </a:xfrm>
+        </p:spPr>
+        <p:txBody>
+          <a:bodyPr/>
+          <a:lstStyle/>
+          <a:p>
+            <a:r>
+              <a:rPr lang="en-GB" dirty="0"/>
+              <a:t>2</a:t>
+            </a:r>
+            <a:r>
+              <a:rPr lang="en-GB" baseline="30000" dirty="0"/>
+              <a:t>nd</a:t>
+            </a:r>
+            <a:r>
+              <a:rPr lang="en-GB" dirty="0"/>
+              <a:t> added loop to continue asking for items</a:t>
+            </a:r>
+            <a:br>
+              <a:rPr lang="en-GB" dirty="0"/>
+            </a:br>
+            <a:r>
+              <a:rPr lang="en-GB" dirty="0"/>
+              <a:t>q to break </a:t>
+            </a:r>
+          </a:p>
+        </p:txBody>
+      </p:sp>
+      <p:pic>
+        <p:nvPicPr>
+          <p:cNvPr id="11" name="Content Placeholder 10" descr="A screenshot of a computer code&#10;&#10;AI-generated content may be incorrect.">
+            <a:extLst>
+              <a:ext uri="{FF2B5EF4-FFF2-40B4-BE49-F238E27FC236}">
+                <a16:creationId xmlns:a16="http://schemas.microsoft.com/office/drawing/2014/main" id="{6FE1E951-19AC-53F2-F09C-54BF06352479}"/>
+              </a:ext>
+            </a:extLst>
+          </p:cNvPr>
+          <p:cNvPicPr>
+            <a:picLocks noGrp="1" noChangeAspect="1"/>
+          </p:cNvPicPr>
+          <p:nvPr>
+            <p:ph idx="1"/>
+          </p:nvPr>
+        </p:nvPicPr>
+        <p:blipFill>
+          <a:blip r:embed="rId2">
+            <a:extLst>
+              <a:ext uri="{28A0092B-C50C-407E-A947-70E740481C1C}">
+                <a14:useLocalDpi xmlns:a14="http://schemas.microsoft.com/office/drawing/2010/main" val="0"/>
+              </a:ext>
+            </a:extLst>
+          </a:blip>
+          <a:stretch>
+            <a:fillRect/>
+          </a:stretch>
+        </p:blipFill>
+        <p:spPr>
+          <a:xfrm>
+            <a:off x="1612926" y="1507808"/>
+            <a:ext cx="3089704" cy="5041096"/>
+          </a:xfrm>
+        </p:spPr>
+      </p:pic>
+      <p:pic>
+        <p:nvPicPr>
+          <p:cNvPr id="13" name="Picture 12" descr="A screenshot of a computer&#10;&#10;AI-generated content may be incorrect.">
+            <a:extLst>
+              <a:ext uri="{FF2B5EF4-FFF2-40B4-BE49-F238E27FC236}">
+                <a16:creationId xmlns:a16="http://schemas.microsoft.com/office/drawing/2014/main" id="{2FE78B0A-6938-73DE-1C75-CC373DD5C1DF}"/>
+              </a:ext>
+            </a:extLst>
+          </p:cNvPr>
+          <p:cNvPicPr>
+            <a:picLocks noChangeAspect="1"/>
+          </p:cNvPicPr>
+          <p:nvPr/>
+        </p:nvPicPr>
+        <p:blipFill>
+          <a:blip r:embed="rId3">
+            <a:extLst>
+              <a:ext uri="{28A0092B-C50C-407E-A947-70E740481C1C}">
+                <a14:useLocalDpi xmlns:a14="http://schemas.microsoft.com/office/drawing/2010/main" val="0"/>
+              </a:ext>
+            </a:extLst>
+          </a:blip>
+          <a:stretch>
+            <a:fillRect/>
+          </a:stretch>
+        </p:blipFill>
+        <p:spPr>
+          <a:xfrm>
+            <a:off x="6747475" y="1345533"/>
+            <a:ext cx="1720470" cy="5203371"/>
+          </a:xfrm>
+          <a:prstGeom prst="rect">
+            <a:avLst/>
+          </a:prstGeom>
+        </p:spPr>
+      </p:pic>
+    </p:spTree>
+    <p:extLst>
+      <p:ext uri="{BB962C8B-B14F-4D97-AF65-F5344CB8AC3E}">
+        <p14:creationId xmlns:p14="http://schemas.microsoft.com/office/powerpoint/2010/main" val="3760246311"/>
+      </p:ext>
+    </p:extLst>
+  </p:cSld>
+  <p:clrMapOvr>
+    <a:masterClrMapping/>
+  </p:clrMapOvr>
+</p:sld>
+</file>
+
+<file path=ppt/slides/slide4.xml><?xml version="1.0" encoding="utf-8"?>
+<p:sld xmlns:a="http://schemas.openxmlformats.org/drawingml/2006/main" xmlns:r="http://schemas.openxmlformats.org/officeDocument/2006/relationships" xmlns:p="http://schemas.openxmlformats.org/presentationml/2006/main">
+  <p:cSld>
+    <p:spTree>
+      <p:nvGrpSpPr>
+        <p:cNvPr id="1" name=""/>
+        <p:cNvGrpSpPr/>
+        <p:nvPr/>
+      </p:nvGrpSpPr>
+      <p:grpSpPr>
+        <a:xfrm>
+          <a:off x="0" y="0"/>
+          <a:ext cx="0" cy="0"/>
+          <a:chOff x="0" y="0"/>
+          <a:chExt cx="0" cy="0"/>
+        </a:xfrm>
+      </p:grpSpPr>
+      <p:sp>
+        <p:nvSpPr>
+          <p:cNvPr id="2" name="Title 1">
+            <a:extLst>
+              <a:ext uri="{FF2B5EF4-FFF2-40B4-BE49-F238E27FC236}">
+                <a16:creationId xmlns:a16="http://schemas.microsoft.com/office/drawing/2014/main" id="{8E21CA3A-EE4D-FB2D-166D-C46D89334A1D}"/>
+              </a:ext>
+            </a:extLst>
+          </p:cNvPr>
+          <p:cNvSpPr>
+            <a:spLocks noGrp="1"/>
+          </p:cNvSpPr>
+          <p:nvPr>
+            <p:ph type="title"/>
+          </p:nvPr>
+        </p:nvSpPr>
+        <p:spPr/>
+        <p:txBody>
+          <a:bodyPr/>
+          <a:lstStyle/>
+          <a:p>
+            <a:r>
+              <a:rPr lang="en-GB" dirty="0"/>
+              <a:t>3</a:t>
+            </a:r>
+            <a:r>
+              <a:rPr lang="en-GB" baseline="30000" dirty="0"/>
+              <a:t>rd</a:t>
+            </a:r>
+            <a:r>
+              <a:rPr lang="en-GB" dirty="0"/>
+              <a:t> tip calculator</a:t>
+            </a:r>
+          </a:p>
+        </p:txBody>
+      </p:sp>
+      <p:pic>
+        <p:nvPicPr>
+          <p:cNvPr id="5" name="Content Placeholder 4" descr="A screenshot of a computer code&#10;&#10;AI-generated content may be incorrect.">
+            <a:extLst>
+              <a:ext uri="{FF2B5EF4-FFF2-40B4-BE49-F238E27FC236}">
+                <a16:creationId xmlns:a16="http://schemas.microsoft.com/office/drawing/2014/main" id="{55A6516F-AD6A-1111-12B9-19970EBF0E31}"/>
+              </a:ext>
+            </a:extLst>
+          </p:cNvPr>
+          <p:cNvPicPr>
+            <a:picLocks noGrp="1" noChangeAspect="1"/>
+          </p:cNvPicPr>
+          <p:nvPr>
+            <p:ph idx="1"/>
+          </p:nvPr>
+        </p:nvPicPr>
+        <p:blipFill>
+          <a:blip r:embed="rId2">
+            <a:extLst>
+              <a:ext uri="{28A0092B-C50C-407E-A947-70E740481C1C}">
+                <a14:useLocalDpi xmlns:a14="http://schemas.microsoft.com/office/drawing/2010/main" val="0"/>
+              </a:ext>
+            </a:extLst>
+          </a:blip>
+          <a:stretch>
+            <a:fillRect/>
+          </a:stretch>
+        </p:blipFill>
+        <p:spPr>
+          <a:xfrm>
+            <a:off x="5177493" y="1621745"/>
+            <a:ext cx="5050393" cy="2925019"/>
+          </a:xfrm>
+        </p:spPr>
+      </p:pic>
+      <p:pic>
+        <p:nvPicPr>
+          <p:cNvPr id="7" name="Picture 6" descr="A screenshot of a menu&#10;&#10;AI-generated content may be incorrect.">
+            <a:extLst>
+              <a:ext uri="{FF2B5EF4-FFF2-40B4-BE49-F238E27FC236}">
+                <a16:creationId xmlns:a16="http://schemas.microsoft.com/office/drawing/2014/main" id="{129AF40C-3584-DBFD-F5BE-3121B100ADF1}"/>
+              </a:ext>
+            </a:extLst>
+          </p:cNvPr>
+          <p:cNvPicPr>
+            <a:picLocks noChangeAspect="1"/>
+          </p:cNvPicPr>
+          <p:nvPr/>
+        </p:nvPicPr>
+        <p:blipFill>
+          <a:blip r:embed="rId3">
+            <a:extLst>
+              <a:ext uri="{28A0092B-C50C-407E-A947-70E740481C1C}">
+                <a14:useLocalDpi xmlns:a14="http://schemas.microsoft.com/office/drawing/2010/main" val="0"/>
+              </a:ext>
+            </a:extLst>
+          </a:blip>
+          <a:stretch>
+            <a:fillRect/>
+          </a:stretch>
+        </p:blipFill>
+        <p:spPr>
+          <a:xfrm>
+            <a:off x="505721" y="1690688"/>
+            <a:ext cx="3066473" cy="4818743"/>
+          </a:xfrm>
+          <a:prstGeom prst="rect">
+            <a:avLst/>
+          </a:prstGeom>
+        </p:spPr>
+      </p:pic>
+      <p:sp>
+        <p:nvSpPr>
+          <p:cNvPr id="8" name="TextBox 7">
+            <a:extLst>
+              <a:ext uri="{FF2B5EF4-FFF2-40B4-BE49-F238E27FC236}">
+                <a16:creationId xmlns:a16="http://schemas.microsoft.com/office/drawing/2014/main" id="{C13D0700-EFE0-32BE-0529-3D790C615069}"/>
+              </a:ext>
+            </a:extLst>
+          </p:cNvPr>
+          <p:cNvSpPr txBox="1"/>
+          <p:nvPr/>
+        </p:nvSpPr>
+        <p:spPr>
+          <a:xfrm>
+            <a:off x="4717143" y="4746171"/>
+            <a:ext cx="6516914" cy="923330"/>
+          </a:xfrm>
+          <a:prstGeom prst="rect">
+            <a:avLst/>
+          </a:prstGeom>
+          <a:noFill/>
+        </p:spPr>
+        <p:txBody>
+          <a:bodyPr wrap="square" rtlCol="0">
+            <a:spAutoFit/>
+          </a:bodyPr>
+          <a:lstStyle/>
+          <a:p>
+            <a:r>
+              <a:rPr lang="en-GB" dirty="0"/>
+              <a:t>Tip calculator function started, figure options work, no tip and custom not functional</a:t>
+            </a:r>
+          </a:p>
+          <a:p>
+            <a:endParaRPr lang="en-GB" dirty="0"/>
+          </a:p>
+        </p:txBody>
+      </p:sp>
+    </p:spTree>
+    <p:extLst>
+      <p:ext uri="{BB962C8B-B14F-4D97-AF65-F5344CB8AC3E}">
+        <p14:creationId xmlns:p14="http://schemas.microsoft.com/office/powerpoint/2010/main" val="4131830494"/>
+      </p:ext>
+    </p:extLst>
+  </p:cSld>
+  <p:clrMapOvr>
+    <a:masterClrMapping/>
+  </p:clrMapOvr>
+</p:sld>
+</file>
+
+<file path=ppt/slides/slide5.xml><?xml version="1.0" encoding="utf-8"?>
+<p:sld xmlns:a="http://schemas.openxmlformats.org/drawingml/2006/main" xmlns:r="http://schemas.openxmlformats.org/officeDocument/2006/relationships" xmlns:p="http://schemas.openxmlformats.org/presentationml/2006/main">
+  <p:cSld>
+    <p:spTree>
+      <p:nvGrpSpPr>
+        <p:cNvPr id="1" name=""/>
+        <p:cNvGrpSpPr/>
+        <p:nvPr/>
+      </p:nvGrpSpPr>
+      <p:grpSpPr>
+        <a:xfrm>
+          <a:off x="0" y="0"/>
+          <a:ext cx="0" cy="0"/>
+          <a:chOff x="0" y="0"/>
+          <a:chExt cx="0" cy="0"/>
+        </a:xfrm>
+      </p:grpSpPr>
+      <p:sp>
+        <p:nvSpPr>
+          <p:cNvPr id="2" name="Title 1">
+            <a:extLst>
+              <a:ext uri="{FF2B5EF4-FFF2-40B4-BE49-F238E27FC236}">
+                <a16:creationId xmlns:a16="http://schemas.microsoft.com/office/drawing/2014/main" id="{700961BB-984D-02C2-02B2-3BCD4BC924A4}"/>
+              </a:ext>
+            </a:extLst>
+          </p:cNvPr>
+          <p:cNvSpPr>
+            <a:spLocks noGrp="1"/>
+          </p:cNvSpPr>
+          <p:nvPr>
+            <p:ph type="title"/>
+          </p:nvPr>
+        </p:nvSpPr>
+        <p:spPr/>
+        <p:txBody>
+          <a:bodyPr/>
+          <a:lstStyle/>
+          <a:p>
+            <a:r>
+              <a:rPr lang="en-GB" dirty="0"/>
+              <a:t>4</a:t>
+            </a:r>
+            <a:r>
+              <a:rPr lang="en-GB" baseline="30000" dirty="0"/>
+              <a:t>th</a:t>
+            </a:r>
+            <a:r>
+              <a:rPr lang="en-GB" dirty="0"/>
+              <a:t> custom option float error</a:t>
+            </a:r>
+          </a:p>
+        </p:txBody>
+      </p:sp>
+      <p:pic>
+        <p:nvPicPr>
+          <p:cNvPr id="5" name="Content Placeholder 4" descr="A white background with red and blue text&#10;&#10;AI-generated content may be incorrect.">
+            <a:extLst>
+              <a:ext uri="{FF2B5EF4-FFF2-40B4-BE49-F238E27FC236}">
+                <a16:creationId xmlns:a16="http://schemas.microsoft.com/office/drawing/2014/main" id="{FD017DD4-6E61-0717-1DBD-5621F13AB62E}"/>
+              </a:ext>
+            </a:extLst>
+          </p:cNvPr>
+          <p:cNvPicPr>
+            <a:picLocks noGrp="1" noChangeAspect="1"/>
+          </p:cNvPicPr>
+          <p:nvPr>
+            <p:ph idx="1"/>
+          </p:nvPr>
+        </p:nvPicPr>
+        <p:blipFill>
+          <a:blip r:embed="rId2">
+            <a:extLst>
+              <a:ext uri="{28A0092B-C50C-407E-A947-70E740481C1C}">
+                <a14:useLocalDpi xmlns:a14="http://schemas.microsoft.com/office/drawing/2010/main" val="0"/>
+              </a:ext>
+            </a:extLst>
+          </a:blip>
+          <a:stretch>
+            <a:fillRect/>
+          </a:stretch>
+        </p:blipFill>
+        <p:spPr>
+          <a:xfrm>
+            <a:off x="988253" y="2202986"/>
+            <a:ext cx="7850945" cy="4289889"/>
+          </a:xfrm>
+        </p:spPr>
+      </p:pic>
+      <p:pic>
+        <p:nvPicPr>
+          <p:cNvPr id="7" name="Picture 6" descr="A screenshot of a computer program&#10;&#10;AI-generated content may be incorrect.">
+            <a:extLst>
+              <a:ext uri="{FF2B5EF4-FFF2-40B4-BE49-F238E27FC236}">
+                <a16:creationId xmlns:a16="http://schemas.microsoft.com/office/drawing/2014/main" id="{CCB9A00A-BE1A-F36C-2958-F8982C20D2CF}"/>
+              </a:ext>
+            </a:extLst>
+          </p:cNvPr>
+          <p:cNvPicPr>
+            <a:picLocks noChangeAspect="1"/>
+          </p:cNvPicPr>
+          <p:nvPr/>
+        </p:nvPicPr>
+        <p:blipFill>
+          <a:blip r:embed="rId3">
+            <a:extLst>
+              <a:ext uri="{28A0092B-C50C-407E-A947-70E740481C1C}">
+                <a14:useLocalDpi xmlns:a14="http://schemas.microsoft.com/office/drawing/2010/main" val="0"/>
+              </a:ext>
+            </a:extLst>
+          </a:blip>
+          <a:stretch>
+            <a:fillRect/>
+          </a:stretch>
+        </p:blipFill>
+        <p:spPr>
+          <a:xfrm>
+            <a:off x="4397249" y="2202986"/>
+            <a:ext cx="4707415" cy="2760889"/>
+          </a:xfrm>
+          <a:prstGeom prst="rect">
+            <a:avLst/>
+          </a:prstGeom>
+        </p:spPr>
+      </p:pic>
+    </p:spTree>
+    <p:extLst>
+      <p:ext uri="{BB962C8B-B14F-4D97-AF65-F5344CB8AC3E}">
+        <p14:creationId xmlns:p14="http://schemas.microsoft.com/office/powerpoint/2010/main" val="3764378544"/>
+      </p:ext>
+    </p:extLst>
+  </p:cSld>
+  <p:clrMapOvr>
+    <a:masterClrMapping/>
+  </p:clrMapOvr>
+</p:sld>
+</file>
+
+<file path=ppt/slides/slide6.xml><?xml version="1.0" encoding="utf-8"?>
+<p:sld xmlns:a="http://schemas.openxmlformats.org/drawingml/2006/main" xmlns:r="http://schemas.openxmlformats.org/officeDocument/2006/relationships" xmlns:p="http://schemas.openxmlformats.org/presentationml/2006/main">
+  <p:cSld>
+    <p:spTree>
+      <p:nvGrpSpPr>
+        <p:cNvPr id="1" name=""/>
+        <p:cNvGrpSpPr/>
+        <p:nvPr/>
+      </p:nvGrpSpPr>
+      <p:grpSpPr>
+        <a:xfrm>
+          <a:off x="0" y="0"/>
+          <a:ext cx="0" cy="0"/>
+          <a:chOff x="0" y="0"/>
+          <a:chExt cx="0" cy="0"/>
+        </a:xfrm>
+      </p:grpSpPr>
+      <p:sp>
+        <p:nvSpPr>
+          <p:cNvPr id="2" name="Title 1">
+            <a:extLst>
+              <a:ext uri="{FF2B5EF4-FFF2-40B4-BE49-F238E27FC236}">
+                <a16:creationId xmlns:a16="http://schemas.microsoft.com/office/drawing/2014/main" id="{77B617F0-D53B-48C9-9C66-D170FA82866E}"/>
+              </a:ext>
+            </a:extLst>
+          </p:cNvPr>
+          <p:cNvSpPr>
+            <a:spLocks noGrp="1"/>
+          </p:cNvSpPr>
+          <p:nvPr>
+            <p:ph type="title"/>
+          </p:nvPr>
+        </p:nvSpPr>
+        <p:spPr/>
+        <p:txBody>
+          <a:bodyPr/>
+          <a:lstStyle/>
+          <a:p>
+            <a:r>
+              <a:rPr lang="en-GB" dirty="0"/>
+              <a:t>Format issue with decimals</a:t>
+            </a:r>
+          </a:p>
+        </p:txBody>
+      </p:sp>
+      <p:pic>
+        <p:nvPicPr>
+          <p:cNvPr id="5" name="Content Placeholder 4" descr="A screenshot of a computer&#10;&#10;AI-generated content may be incorrect.">
+            <a:extLst>
+              <a:ext uri="{FF2B5EF4-FFF2-40B4-BE49-F238E27FC236}">
+                <a16:creationId xmlns:a16="http://schemas.microsoft.com/office/drawing/2014/main" id="{1669D17D-EB36-5D87-3912-18D1C8CD49E7}"/>
+              </a:ext>
+            </a:extLst>
+          </p:cNvPr>
+          <p:cNvPicPr>
+            <a:picLocks noGrp="1" noChangeAspect="1"/>
+          </p:cNvPicPr>
+          <p:nvPr>
+            <p:ph idx="1"/>
+          </p:nvPr>
+        </p:nvPicPr>
+        <p:blipFill>
+          <a:blip r:embed="rId2">
+            <a:extLst>
+              <a:ext uri="{28A0092B-C50C-407E-A947-70E740481C1C}">
+                <a14:useLocalDpi xmlns:a14="http://schemas.microsoft.com/office/drawing/2010/main" val="0"/>
+              </a:ext>
+            </a:extLst>
+          </a:blip>
+          <a:stretch>
+            <a:fillRect/>
+          </a:stretch>
+        </p:blipFill>
+        <p:spPr>
+          <a:xfrm>
+            <a:off x="518885" y="1491797"/>
+            <a:ext cx="3472543" cy="4452758"/>
+          </a:xfrm>
+        </p:spPr>
+      </p:pic>
+      <p:pic>
+        <p:nvPicPr>
+          <p:cNvPr id="7" name="Picture 6" descr="A screenshot of a computer&#10;&#10;AI-generated content may be incorrect.">
+            <a:extLst>
+              <a:ext uri="{FF2B5EF4-FFF2-40B4-BE49-F238E27FC236}">
+                <a16:creationId xmlns:a16="http://schemas.microsoft.com/office/drawing/2014/main" id="{0F73C773-5602-E286-FFF1-CD13F772E2FD}"/>
+              </a:ext>
+            </a:extLst>
+          </p:cNvPr>
+          <p:cNvPicPr>
+            <a:picLocks noChangeAspect="1"/>
+          </p:cNvPicPr>
+          <p:nvPr/>
+        </p:nvPicPr>
+        <p:blipFill>
+          <a:blip r:embed="rId3">
+            <a:extLst>
+              <a:ext uri="{28A0092B-C50C-407E-A947-70E740481C1C}">
+                <a14:useLocalDpi xmlns:a14="http://schemas.microsoft.com/office/drawing/2010/main" val="0"/>
+              </a:ext>
+            </a:extLst>
+          </a:blip>
+          <a:stretch>
+            <a:fillRect/>
+          </a:stretch>
+        </p:blipFill>
+        <p:spPr>
+          <a:xfrm>
+            <a:off x="3824462" y="1480911"/>
+            <a:ext cx="3991532" cy="1609950"/>
+          </a:xfrm>
+          <a:prstGeom prst="rect">
+            <a:avLst/>
+          </a:prstGeom>
+        </p:spPr>
+      </p:pic>
+      <p:pic>
+        <p:nvPicPr>
+          <p:cNvPr id="9" name="Picture 8">
+            <a:extLst>
+              <a:ext uri="{FF2B5EF4-FFF2-40B4-BE49-F238E27FC236}">
+                <a16:creationId xmlns:a16="http://schemas.microsoft.com/office/drawing/2014/main" id="{B452DE78-649E-F3C0-63EF-C57F62408905}"/>
+              </a:ext>
+            </a:extLst>
+          </p:cNvPr>
+          <p:cNvPicPr>
+            <a:picLocks noChangeAspect="1"/>
+          </p:cNvPicPr>
+          <p:nvPr/>
+        </p:nvPicPr>
+        <p:blipFill>
+          <a:blip r:embed="rId4">
+            <a:extLst>
+              <a:ext uri="{28A0092B-C50C-407E-A947-70E740481C1C}">
+                <a14:useLocalDpi xmlns:a14="http://schemas.microsoft.com/office/drawing/2010/main" val="0"/>
+              </a:ext>
+            </a:extLst>
+          </a:blip>
+          <a:stretch>
+            <a:fillRect/>
+          </a:stretch>
+        </p:blipFill>
+        <p:spPr>
+          <a:xfrm>
+            <a:off x="2385785" y="3307794"/>
+            <a:ext cx="9656354" cy="625578"/>
+          </a:xfrm>
+          <a:prstGeom prst="rect">
+            <a:avLst/>
+          </a:prstGeom>
+        </p:spPr>
+      </p:pic>
+      <p:sp>
+        <p:nvSpPr>
+          <p:cNvPr id="10" name="TextBox 9">
+            <a:extLst>
+              <a:ext uri="{FF2B5EF4-FFF2-40B4-BE49-F238E27FC236}">
+                <a16:creationId xmlns:a16="http://schemas.microsoft.com/office/drawing/2014/main" id="{8DEF39C4-29E1-C068-B0F9-83F8F3689295}"/>
+              </a:ext>
+            </a:extLst>
+          </p:cNvPr>
+          <p:cNvSpPr txBox="1"/>
+          <p:nvPr/>
+        </p:nvSpPr>
+        <p:spPr>
+          <a:xfrm>
+            <a:off x="4470400" y="4513943"/>
+            <a:ext cx="4978400" cy="1200329"/>
+          </a:xfrm>
+          <a:prstGeom prst="rect">
+            <a:avLst/>
+          </a:prstGeom>
+          <a:noFill/>
+        </p:spPr>
+        <p:txBody>
+          <a:bodyPr wrap="square" rtlCol="0">
+            <a:spAutoFit/>
+          </a:bodyPr>
+          <a:lstStyle/>
+          <a:p>
+            <a:r>
+              <a:rPr lang="en-GB" dirty="0"/>
+              <a:t>Round function rounds decimal and formats it to 2 decimal places due to (result, 2), the 2 meaning 2 decimal places</a:t>
+            </a:r>
+          </a:p>
+          <a:p>
+            <a:endParaRPr lang="en-GB" dirty="0"/>
+          </a:p>
+        </p:txBody>
+      </p:sp>
+    </p:spTree>
+    <p:extLst>
+      <p:ext uri="{BB962C8B-B14F-4D97-AF65-F5344CB8AC3E}">
+        <p14:creationId xmlns:p14="http://schemas.microsoft.com/office/powerpoint/2010/main" val="2386745485"/>
+      </p:ext>
+    </p:extLst>
+  </p:cSld>
+  <p:clrMapOvr>
+    <a:masterClrMapping/>
+  </p:clrMapOvr>
+</p:sld>
+</file>
+
+<file path=ppt/slides/slide7.xml><?xml version="1.0" encoding="utf-8"?>
+<p:sld xmlns:a="http://schemas.openxmlformats.org/drawingml/2006/main" xmlns:r="http://schemas.openxmlformats.org/officeDocument/2006/relationships" xmlns:p="http://schemas.openxmlformats.org/presentationml/2006/main">
+  <p:cSld>
+    <p:spTree>
+      <p:nvGrpSpPr>
+        <p:cNvPr id="1" name=""/>
+        <p:cNvGrpSpPr/>
+        <p:nvPr/>
+      </p:nvGrpSpPr>
+      <p:grpSpPr>
+        <a:xfrm>
+          <a:off x="0" y="0"/>
+          <a:ext cx="0" cy="0"/>
+          <a:chOff x="0" y="0"/>
+          <a:chExt cx="0" cy="0"/>
+        </a:xfrm>
+      </p:grpSpPr>
+      <p:sp>
+        <p:nvSpPr>
+          <p:cNvPr id="2" name="Title 1">
+            <a:extLst>
+              <a:ext uri="{FF2B5EF4-FFF2-40B4-BE49-F238E27FC236}">
+                <a16:creationId xmlns:a16="http://schemas.microsoft.com/office/drawing/2014/main" id="{95280F2E-8B48-E83A-BB71-784428C718D8}"/>
+              </a:ext>
+            </a:extLst>
+          </p:cNvPr>
+          <p:cNvSpPr>
+            <a:spLocks noGrp="1"/>
+          </p:cNvSpPr>
+          <p:nvPr>
+            <p:ph type="title"/>
+          </p:nvPr>
+        </p:nvSpPr>
+        <p:spPr/>
+        <p:txBody>
+          <a:bodyPr/>
+          <a:lstStyle/>
+          <a:p>
+            <a:r>
+              <a:rPr lang="en-GB" dirty="0"/>
+              <a:t>Result that states tip amount, bill, overall</a:t>
+            </a:r>
+          </a:p>
+        </p:txBody>
+      </p:sp>
+      <p:pic>
+        <p:nvPicPr>
+          <p:cNvPr id="5" name="Content Placeholder 4" descr="A screenshot of a computer code&#10;&#10;AI-generated content may be incorrect.">
+            <a:extLst>
+              <a:ext uri="{FF2B5EF4-FFF2-40B4-BE49-F238E27FC236}">
+                <a16:creationId xmlns:a16="http://schemas.microsoft.com/office/drawing/2014/main" id="{2D741AC3-CACC-29A2-1EA8-708929B70032}"/>
+              </a:ext>
+            </a:extLst>
+          </p:cNvPr>
+          <p:cNvPicPr>
+            <a:picLocks noGrp="1" noChangeAspect="1"/>
+          </p:cNvPicPr>
+          <p:nvPr>
+            <p:ph idx="1"/>
+          </p:nvPr>
+        </p:nvPicPr>
+        <p:blipFill>
+          <a:blip r:embed="rId2">
+            <a:extLst>
+              <a:ext uri="{28A0092B-C50C-407E-A947-70E740481C1C}">
+                <a14:useLocalDpi xmlns:a14="http://schemas.microsoft.com/office/drawing/2010/main" val="0"/>
+              </a:ext>
+            </a:extLst>
+          </a:blip>
+          <a:stretch>
+            <a:fillRect/>
+          </a:stretch>
+        </p:blipFill>
+        <p:spPr>
+          <a:xfrm>
+            <a:off x="440538" y="1690688"/>
+            <a:ext cx="6948733" cy="2555287"/>
+          </a:xfrm>
+        </p:spPr>
+      </p:pic>
+      <p:pic>
+        <p:nvPicPr>
+          <p:cNvPr id="7" name="Picture 6" descr="A screenshot of a computer code&#10;&#10;AI-generated content may be incorrect.">
+            <a:extLst>
+              <a:ext uri="{FF2B5EF4-FFF2-40B4-BE49-F238E27FC236}">
+                <a16:creationId xmlns:a16="http://schemas.microsoft.com/office/drawing/2014/main" id="{6BA306A6-1AE4-0A4E-45DA-5E729CF567AF}"/>
+              </a:ext>
+            </a:extLst>
+          </p:cNvPr>
+          <p:cNvPicPr>
+            <a:picLocks noChangeAspect="1"/>
+          </p:cNvPicPr>
+          <p:nvPr/>
+        </p:nvPicPr>
+        <p:blipFill>
+          <a:blip r:embed="rId3">
+            <a:extLst>
+              <a:ext uri="{28A0092B-C50C-407E-A947-70E740481C1C}">
+                <a14:useLocalDpi xmlns:a14="http://schemas.microsoft.com/office/drawing/2010/main" val="0"/>
+              </a:ext>
+            </a:extLst>
+          </a:blip>
+          <a:stretch>
+            <a:fillRect/>
+          </a:stretch>
+        </p:blipFill>
+        <p:spPr>
+          <a:xfrm>
+            <a:off x="440538" y="4495690"/>
+            <a:ext cx="6163462" cy="2146308"/>
+          </a:xfrm>
+          <a:prstGeom prst="rect">
+            <a:avLst/>
+          </a:prstGeom>
+        </p:spPr>
+      </p:pic>
+    </p:spTree>
+    <p:extLst>
+      <p:ext uri="{BB962C8B-B14F-4D97-AF65-F5344CB8AC3E}">
+        <p14:creationId xmlns:p14="http://schemas.microsoft.com/office/powerpoint/2010/main" val="2756231743"/>
+      </p:ext>
+    </p:extLst>
+  </p:cSld>
+  <p:clrMapOvr>
+    <a:masterClrMapping/>
+  </p:clrMapOvr>
+</p:sld>
+</file>
+
+<file path=ppt/slides/slide8.xml><?xml version="1.0" encoding="utf-8"?>
+<p:sld xmlns:a="http://schemas.openxmlformats.org/drawingml/2006/main" xmlns:r="http://schemas.openxmlformats.org/officeDocument/2006/relationships" xmlns:p="http://schemas.openxmlformats.org/presentationml/2006/main">
+  <p:cSld>
+    <p:spTree>
+      <p:nvGrpSpPr>
+        <p:cNvPr id="1" name=""/>
+        <p:cNvGrpSpPr/>
+        <p:nvPr/>
+      </p:nvGrpSpPr>
+      <p:grpSpPr>
+        <a:xfrm>
+          <a:off x="0" y="0"/>
+          <a:ext cx="0" cy="0"/>
+          <a:chOff x="0" y="0"/>
+          <a:chExt cx="0" cy="0"/>
+        </a:xfrm>
+      </p:grpSpPr>
+      <p:sp>
+        <p:nvSpPr>
+          <p:cNvPr id="2" name="Title 1">
+            <a:extLst>
+              <a:ext uri="{FF2B5EF4-FFF2-40B4-BE49-F238E27FC236}">
+                <a16:creationId xmlns:a16="http://schemas.microsoft.com/office/drawing/2014/main" id="{2A2C4AA6-3DEB-D10E-949C-021FC16C78C5}"/>
+              </a:ext>
+            </a:extLst>
+          </p:cNvPr>
+          <p:cNvSpPr>
+            <a:spLocks noGrp="1"/>
+          </p:cNvSpPr>
+          <p:nvPr>
+            <p:ph type="title"/>
+          </p:nvPr>
+        </p:nvSpPr>
+        <p:spPr/>
+        <p:txBody>
+          <a:bodyPr>
+            <a:normAutofit fontScale="90000"/>
+          </a:bodyPr>
+          <a:lstStyle/>
+          <a:p>
+            <a:r>
+              <a:rPr lang="en-GB" dirty="0"/>
+              <a:t>Response to 4</a:t>
+            </a:r>
+            <a:r>
+              <a:rPr lang="en-GB" baseline="30000" dirty="0"/>
+              <a:t>th</a:t>
+            </a:r>
+            <a:r>
+              <a:rPr lang="en-GB" dirty="0"/>
+              <a:t> attempted alternate way, works</a:t>
+            </a:r>
+            <a:br>
+              <a:rPr lang="en-GB" dirty="0"/>
+            </a:br>
+            <a:endParaRPr lang="en-GB" dirty="0"/>
+          </a:p>
+        </p:txBody>
+      </p:sp>
+      <p:pic>
+        <p:nvPicPr>
+          <p:cNvPr id="7" name="Picture 6" descr="A screenshot of a computer program&#10;&#10;AI-generated content may be incorrect.">
+            <a:extLst>
+              <a:ext uri="{FF2B5EF4-FFF2-40B4-BE49-F238E27FC236}">
+                <a16:creationId xmlns:a16="http://schemas.microsoft.com/office/drawing/2014/main" id="{7A4C35D9-2748-56B6-BF4B-D33540234919}"/>
+              </a:ext>
+            </a:extLst>
+          </p:cNvPr>
+          <p:cNvPicPr>
+            <a:picLocks noChangeAspect="1"/>
+          </p:cNvPicPr>
+          <p:nvPr/>
+        </p:nvPicPr>
+        <p:blipFill>
+          <a:blip r:embed="rId2">
+            <a:extLst>
+              <a:ext uri="{28A0092B-C50C-407E-A947-70E740481C1C}">
+                <a14:useLocalDpi xmlns:a14="http://schemas.microsoft.com/office/drawing/2010/main" val="0"/>
+              </a:ext>
+            </a:extLst>
+          </a:blip>
+          <a:stretch>
+            <a:fillRect/>
+          </a:stretch>
+        </p:blipFill>
+        <p:spPr>
+          <a:xfrm>
+            <a:off x="838200" y="1957012"/>
+            <a:ext cx="6600596" cy="4356702"/>
+          </a:xfrm>
+          <a:prstGeom prst="rect">
+            <a:avLst/>
+          </a:prstGeom>
+        </p:spPr>
+      </p:pic>
+      <p:pic>
+        <p:nvPicPr>
+          <p:cNvPr id="5" name="Content Placeholder 4" descr="A screenshot of a computer code&#10;&#10;AI-generated content may be incorrect.">
+            <a:extLst>
+              <a:ext uri="{FF2B5EF4-FFF2-40B4-BE49-F238E27FC236}">
+                <a16:creationId xmlns:a16="http://schemas.microsoft.com/office/drawing/2014/main" id="{438D63E5-DDC9-0AF5-8A8F-A6CEACD8BE77}"/>
+              </a:ext>
+            </a:extLst>
+          </p:cNvPr>
+          <p:cNvPicPr>
+            <a:picLocks noGrp="1" noChangeAspect="1"/>
+          </p:cNvPicPr>
+          <p:nvPr>
+            <p:ph idx="1"/>
+          </p:nvPr>
+        </p:nvPicPr>
+        <p:blipFill>
+          <a:blip r:embed="rId3">
+            <a:extLst>
+              <a:ext uri="{28A0092B-C50C-407E-A947-70E740481C1C}">
+                <a14:useLocalDpi xmlns:a14="http://schemas.microsoft.com/office/drawing/2010/main" val="0"/>
+              </a:ext>
+            </a:extLst>
+          </a:blip>
+          <a:stretch>
+            <a:fillRect/>
+          </a:stretch>
+        </p:blipFill>
+        <p:spPr>
+          <a:xfrm>
+            <a:off x="6537873" y="1957012"/>
+            <a:ext cx="5125165" cy="2029108"/>
+          </a:xfrm>
+        </p:spPr>
+      </p:pic>
+    </p:spTree>
+    <p:extLst>
+      <p:ext uri="{BB962C8B-B14F-4D97-AF65-F5344CB8AC3E}">
+        <p14:creationId xmlns:p14="http://schemas.microsoft.com/office/powerpoint/2010/main" val="264119337"/>
+      </p:ext>
+    </p:extLst>
+  </p:cSld>
+  <p:clrMapOvr>
+    <a:masterClrMapping/>
+  </p:clrMapOvr>
+</p:sld>
+</file>
+
+<file path=ppt/slides/slide9.xml><?xml version="1.0" encoding="utf-8"?>
+<p:sld xmlns:a="http://schemas.openxmlformats.org/drawingml/2006/main" xmlns:r="http://schemas.openxmlformats.org/officeDocument/2006/relationships" xmlns:p="http://schemas.openxmlformats.org/presentationml/2006/main">
+  <p:cSld>
+    <p:spTree>
+      <p:nvGrpSpPr>
+        <p:cNvPr id="1" name=""/>
+        <p:cNvGrpSpPr/>
+        <p:nvPr/>
+      </p:nvGrpSpPr>
+      <p:grpSpPr>
+        <a:xfrm>
+          <a:off x="0" y="0"/>
+          <a:ext cx="0" cy="0"/>
+          <a:chOff x="0" y="0"/>
+          <a:chExt cx="0" cy="0"/>
+        </a:xfrm>
+      </p:grpSpPr>
+      <p:sp>
+        <p:nvSpPr>
+          <p:cNvPr id="2" name="Title 1">
+            <a:extLst>
+              <a:ext uri="{FF2B5EF4-FFF2-40B4-BE49-F238E27FC236}">
+                <a16:creationId xmlns:a16="http://schemas.microsoft.com/office/drawing/2014/main" id="{66FAD390-0729-2587-910F-C8589ECE86D1}"/>
+              </a:ext>
+            </a:extLst>
+          </p:cNvPr>
+          <p:cNvSpPr>
+            <a:spLocks noGrp="1"/>
+          </p:cNvSpPr>
+          <p:nvPr>
+            <p:ph type="title"/>
+          </p:nvPr>
+        </p:nvSpPr>
+        <p:spPr/>
+        <p:txBody>
+          <a:bodyPr/>
+          <a:lstStyle/>
+          <a:p>
+            <a:r>
+              <a:rPr lang="en-GB" dirty="0"/>
+              <a:t>None option</a:t>
+            </a:r>
+          </a:p>
+        </p:txBody>
+      </p:sp>
+      <p:pic>
+        <p:nvPicPr>
+          <p:cNvPr id="5" name="Content Placeholder 4" descr="A screenshot of a computer code&#10;&#10;AI-generated content may be incorrect.">
+            <a:extLst>
+              <a:ext uri="{FF2B5EF4-FFF2-40B4-BE49-F238E27FC236}">
+                <a16:creationId xmlns:a16="http://schemas.microsoft.com/office/drawing/2014/main" id="{9A504311-59E3-9770-19A5-65271EB943A5}"/>
+              </a:ext>
+            </a:extLst>
+          </p:cNvPr>
+          <p:cNvPicPr>
+            <a:picLocks noGrp="1" noChangeAspect="1"/>
+          </p:cNvPicPr>
+          <p:nvPr>
+            <p:ph idx="1"/>
+          </p:nvPr>
+        </p:nvPicPr>
+        <p:blipFill>
+          <a:blip r:embed="rId2">
+            <a:extLst>
+              <a:ext uri="{28A0092B-C50C-407E-A947-70E740481C1C}">
+                <a14:useLocalDpi xmlns:a14="http://schemas.microsoft.com/office/drawing/2010/main" val="0"/>
+              </a:ext>
+            </a:extLst>
+          </a:blip>
+          <a:stretch>
+            <a:fillRect/>
+          </a:stretch>
+        </p:blipFill>
+        <p:spPr>
+          <a:xfrm>
+            <a:off x="492344" y="1540031"/>
+            <a:ext cx="6136354" cy="2436883"/>
+          </a:xfrm>
+        </p:spPr>
+      </p:pic>
+      <p:pic>
+        <p:nvPicPr>
+          <p:cNvPr id="7" name="Picture 6" descr="A screenshot of a computer program&#10;&#10;AI-generated content may be incorrect.">
+            <a:extLst>
+              <a:ext uri="{FF2B5EF4-FFF2-40B4-BE49-F238E27FC236}">
+                <a16:creationId xmlns:a16="http://schemas.microsoft.com/office/drawing/2014/main" id="{B71B9201-67BE-CD32-3442-53E3FA55AC10}"/>
+              </a:ext>
+            </a:extLst>
+          </p:cNvPr>
+          <p:cNvPicPr>
+            <a:picLocks noChangeAspect="1"/>
+          </p:cNvPicPr>
+          <p:nvPr/>
+        </p:nvPicPr>
+        <p:blipFill>
+          <a:blip r:embed="rId3">
+            <a:extLst>
+              <a:ext uri="{28A0092B-C50C-407E-A947-70E740481C1C}">
+                <a14:useLocalDpi xmlns:a14="http://schemas.microsoft.com/office/drawing/2010/main" val="0"/>
+              </a:ext>
+            </a:extLst>
+          </a:blip>
+          <a:stretch>
+            <a:fillRect/>
+          </a:stretch>
+        </p:blipFill>
+        <p:spPr>
+          <a:xfrm>
+            <a:off x="5545465" y="3976914"/>
+            <a:ext cx="5048955" cy="1914792"/>
+          </a:xfrm>
+          <a:prstGeom prst="rect">
+            <a:avLst/>
+          </a:prstGeom>
+        </p:spPr>
+      </p:pic>
+    </p:spTree>
+    <p:extLst>
+      <p:ext uri="{BB962C8B-B14F-4D97-AF65-F5344CB8AC3E}">
+        <p14:creationId xmlns:p14="http://schemas.microsoft.com/office/powerpoint/2010/main" val="1461443829"/>
       </p:ext>
     </p:extLst>
   </p:cSld>

</xml_diff>